<commit_message>
modified text in pseudo deblending
</commit_message>
<xml_diff>
--- a/Plots/Dawings.pptx
+++ b/Plots/Dawings.pptx
@@ -199,7 +199,7 @@
           <a:p>
             <a:fld id="{3C3D811D-0C75-514B-82C3-D85459426476}" type="datetimeFigureOut">
               <a:rPr lang="en-US" smtClean="0"/>
-              <a:t>6/28/15</a:t>
+              <a:t>7/11/15</a:t>
             </a:fld>
             <a:endParaRPr lang="en-GB"/>
           </a:p>
@@ -984,7 +984,7 @@
           <a:p>
             <a:fld id="{192B58FE-A0CE-A14C-9D3B-3409446C3BF4}" type="datetimeFigureOut">
               <a:rPr lang="en-US" smtClean="0"/>
-              <a:t>6/28/15</a:t>
+              <a:t>7/11/15</a:t>
             </a:fld>
             <a:endParaRPr lang="en-GB"/>
           </a:p>
@@ -1154,7 +1154,7 @@
           <a:p>
             <a:fld id="{192B58FE-A0CE-A14C-9D3B-3409446C3BF4}" type="datetimeFigureOut">
               <a:rPr lang="en-US" smtClean="0"/>
-              <a:t>6/28/15</a:t>
+              <a:t>7/11/15</a:t>
             </a:fld>
             <a:endParaRPr lang="en-GB"/>
           </a:p>
@@ -1334,7 +1334,7 @@
           <a:p>
             <a:fld id="{192B58FE-A0CE-A14C-9D3B-3409446C3BF4}" type="datetimeFigureOut">
               <a:rPr lang="en-US" smtClean="0"/>
-              <a:t>6/28/15</a:t>
+              <a:t>7/11/15</a:t>
             </a:fld>
             <a:endParaRPr lang="en-GB"/>
           </a:p>
@@ -1504,7 +1504,7 @@
           <a:p>
             <a:fld id="{192B58FE-A0CE-A14C-9D3B-3409446C3BF4}" type="datetimeFigureOut">
               <a:rPr lang="en-US" smtClean="0"/>
-              <a:t>6/28/15</a:t>
+              <a:t>7/11/15</a:t>
             </a:fld>
             <a:endParaRPr lang="en-GB"/>
           </a:p>
@@ -1750,7 +1750,7 @@
           <a:p>
             <a:fld id="{192B58FE-A0CE-A14C-9D3B-3409446C3BF4}" type="datetimeFigureOut">
               <a:rPr lang="en-US" smtClean="0"/>
-              <a:t>6/28/15</a:t>
+              <a:t>7/11/15</a:t>
             </a:fld>
             <a:endParaRPr lang="en-GB"/>
           </a:p>
@@ -2038,7 +2038,7 @@
           <a:p>
             <a:fld id="{192B58FE-A0CE-A14C-9D3B-3409446C3BF4}" type="datetimeFigureOut">
               <a:rPr lang="en-US" smtClean="0"/>
-              <a:t>6/28/15</a:t>
+              <a:t>7/11/15</a:t>
             </a:fld>
             <a:endParaRPr lang="en-GB"/>
           </a:p>
@@ -2460,7 +2460,7 @@
           <a:p>
             <a:fld id="{192B58FE-A0CE-A14C-9D3B-3409446C3BF4}" type="datetimeFigureOut">
               <a:rPr lang="en-US" smtClean="0"/>
-              <a:t>6/28/15</a:t>
+              <a:t>7/11/15</a:t>
             </a:fld>
             <a:endParaRPr lang="en-GB"/>
           </a:p>
@@ -2578,7 +2578,7 @@
           <a:p>
             <a:fld id="{192B58FE-A0CE-A14C-9D3B-3409446C3BF4}" type="datetimeFigureOut">
               <a:rPr lang="en-US" smtClean="0"/>
-              <a:t>6/28/15</a:t>
+              <a:t>7/11/15</a:t>
             </a:fld>
             <a:endParaRPr lang="en-GB"/>
           </a:p>
@@ -2673,7 +2673,7 @@
           <a:p>
             <a:fld id="{192B58FE-A0CE-A14C-9D3B-3409446C3BF4}" type="datetimeFigureOut">
               <a:rPr lang="en-US" smtClean="0"/>
-              <a:t>6/28/15</a:t>
+              <a:t>7/11/15</a:t>
             </a:fld>
             <a:endParaRPr lang="en-GB"/>
           </a:p>
@@ -2950,7 +2950,7 @@
           <a:p>
             <a:fld id="{192B58FE-A0CE-A14C-9D3B-3409446C3BF4}" type="datetimeFigureOut">
               <a:rPr lang="en-US" smtClean="0"/>
-              <a:t>6/28/15</a:t>
+              <a:t>7/11/15</a:t>
             </a:fld>
             <a:endParaRPr lang="en-GB"/>
           </a:p>
@@ -3203,7 +3203,7 @@
           <a:p>
             <a:fld id="{192B58FE-A0CE-A14C-9D3B-3409446C3BF4}" type="datetimeFigureOut">
               <a:rPr lang="en-US" smtClean="0"/>
-              <a:t>6/28/15</a:t>
+              <a:t>7/11/15</a:t>
             </a:fld>
             <a:endParaRPr lang="en-GB"/>
           </a:p>
@@ -3416,7 +3416,7 @@
           <a:p>
             <a:fld id="{192B58FE-A0CE-A14C-9D3B-3409446C3BF4}" type="datetimeFigureOut">
               <a:rPr lang="en-US" smtClean="0"/>
-              <a:t>6/28/15</a:t>
+              <a:t>7/11/15</a:t>
             </a:fld>
             <a:endParaRPr lang="en-GB"/>
           </a:p>
@@ -5992,7 +5992,7 @@
             <a:graphicData uri="http://schemas.openxmlformats.org/presentationml/2006/ole">
               <mc:AlternateContent xmlns:mc="http://schemas.openxmlformats.org/markup-compatibility/2006">
                 <mc:Choice xmlns:v="urn:schemas-microsoft-com:vml" Requires="v">
-                  <p:oleObj spid="_x0000_s1128" name="Equation" r:id="rId3" imgW="114300" imgH="165100" progId="Equation.DSMT4">
+                  <p:oleObj spid="_x0000_s1130" name="Equation" r:id="rId3" imgW="114300" imgH="165100" progId="Equation.DSMT4">
                     <p:embed/>
                   </p:oleObj>
                 </mc:Choice>
@@ -13461,11 +13461,39 @@
           <a:p>
             <a:pPr algn="ctr"/>
             <a:r>
+              <a:rPr lang="en-GB" sz="1600" dirty="0">
+                <a:latin typeface="Times New Roman"/>
+                <a:cs typeface="Times New Roman"/>
+              </a:rPr>
+              <a:t>f</a:t>
+            </a:r>
+            <a:r>
               <a:rPr lang="en-GB" sz="1600" dirty="0" smtClean="0">
                 <a:latin typeface="Times New Roman"/>
                 <a:cs typeface="Times New Roman"/>
               </a:rPr>
-              <a:t>F-K-Filtering</a:t>
+              <a:t>-</a:t>
+            </a:r>
+            <a:r>
+              <a:rPr lang="en-GB" sz="1600" dirty="0">
+                <a:latin typeface="Times New Roman"/>
+                <a:cs typeface="Times New Roman"/>
+              </a:rPr>
+              <a:t>k</a:t>
+            </a:r>
+            <a:r>
+              <a:rPr lang="en-GB" sz="1600" dirty="0" smtClean="0">
+                <a:latin typeface="Times New Roman"/>
+                <a:cs typeface="Times New Roman"/>
+              </a:rPr>
+              <a:t>-</a:t>
+            </a:r>
+            <a:r>
+              <a:rPr lang="en-GB" sz="1600" dirty="0" smtClean="0">
+                <a:latin typeface="Times New Roman"/>
+                <a:cs typeface="Times New Roman"/>
+              </a:rPr>
+              <a:t>Filtering</a:t>
             </a:r>
             <a:endParaRPr lang="en-GB" sz="1600" b="1" baseline="-25000" dirty="0">
               <a:latin typeface="Times New Roman"/>

</xml_diff>

<commit_message>
Updated Result Geometry + some details
</commit_message>
<xml_diff>
--- a/Plots/Dawings.pptx
+++ b/Plots/Dawings.pptx
@@ -5,7 +5,7 @@
     <p:sldMasterId id="2147483648" r:id="rId1"/>
   </p:sldMasterIdLst>
   <p:notesMasterIdLst>
-    <p:notesMasterId r:id="rId11"/>
+    <p:notesMasterId r:id="rId13"/>
   </p:notesMasterIdLst>
   <p:sldIdLst>
     <p:sldId id="256" r:id="rId2"/>
@@ -17,6 +17,8 @@
     <p:sldId id="258" r:id="rId8"/>
     <p:sldId id="259" r:id="rId9"/>
     <p:sldId id="264" r:id="rId10"/>
+    <p:sldId id="265" r:id="rId11"/>
+    <p:sldId id="266" r:id="rId12"/>
   </p:sldIdLst>
   <p:sldSz cx="9144000" cy="6858000" type="screen4x3"/>
   <p:notesSz cx="6858000" cy="9144000"/>
@@ -200,7 +202,7 @@
           <a:p>
             <a:fld id="{3C3D811D-0C75-514B-82C3-D85459426476}" type="datetimeFigureOut">
               <a:rPr lang="en-US" smtClean="0"/>
-              <a:t>7/22/15</a:t>
+              <a:t>8/1/15</a:t>
             </a:fld>
             <a:endParaRPr lang="en-GB"/>
           </a:p>
@@ -985,7 +987,7 @@
           <a:p>
             <a:fld id="{192B58FE-A0CE-A14C-9D3B-3409446C3BF4}" type="datetimeFigureOut">
               <a:rPr lang="en-US" smtClean="0"/>
-              <a:t>7/22/15</a:t>
+              <a:t>8/1/15</a:t>
             </a:fld>
             <a:endParaRPr lang="en-GB"/>
           </a:p>
@@ -1155,7 +1157,7 @@
           <a:p>
             <a:fld id="{192B58FE-A0CE-A14C-9D3B-3409446C3BF4}" type="datetimeFigureOut">
               <a:rPr lang="en-US" smtClean="0"/>
-              <a:t>7/22/15</a:t>
+              <a:t>8/1/15</a:t>
             </a:fld>
             <a:endParaRPr lang="en-GB"/>
           </a:p>
@@ -1335,7 +1337,7 @@
           <a:p>
             <a:fld id="{192B58FE-A0CE-A14C-9D3B-3409446C3BF4}" type="datetimeFigureOut">
               <a:rPr lang="en-US" smtClean="0"/>
-              <a:t>7/22/15</a:t>
+              <a:t>8/1/15</a:t>
             </a:fld>
             <a:endParaRPr lang="en-GB"/>
           </a:p>
@@ -1505,7 +1507,7 @@
           <a:p>
             <a:fld id="{192B58FE-A0CE-A14C-9D3B-3409446C3BF4}" type="datetimeFigureOut">
               <a:rPr lang="en-US" smtClean="0"/>
-              <a:t>7/22/15</a:t>
+              <a:t>8/1/15</a:t>
             </a:fld>
             <a:endParaRPr lang="en-GB"/>
           </a:p>
@@ -1751,7 +1753,7 @@
           <a:p>
             <a:fld id="{192B58FE-A0CE-A14C-9D3B-3409446C3BF4}" type="datetimeFigureOut">
               <a:rPr lang="en-US" smtClean="0"/>
-              <a:t>7/22/15</a:t>
+              <a:t>8/1/15</a:t>
             </a:fld>
             <a:endParaRPr lang="en-GB"/>
           </a:p>
@@ -2039,7 +2041,7 @@
           <a:p>
             <a:fld id="{192B58FE-A0CE-A14C-9D3B-3409446C3BF4}" type="datetimeFigureOut">
               <a:rPr lang="en-US" smtClean="0"/>
-              <a:t>7/22/15</a:t>
+              <a:t>8/1/15</a:t>
             </a:fld>
             <a:endParaRPr lang="en-GB"/>
           </a:p>
@@ -2461,7 +2463,7 @@
           <a:p>
             <a:fld id="{192B58FE-A0CE-A14C-9D3B-3409446C3BF4}" type="datetimeFigureOut">
               <a:rPr lang="en-US" smtClean="0"/>
-              <a:t>7/22/15</a:t>
+              <a:t>8/1/15</a:t>
             </a:fld>
             <a:endParaRPr lang="en-GB"/>
           </a:p>
@@ -2579,7 +2581,7 @@
           <a:p>
             <a:fld id="{192B58FE-A0CE-A14C-9D3B-3409446C3BF4}" type="datetimeFigureOut">
               <a:rPr lang="en-US" smtClean="0"/>
-              <a:t>7/22/15</a:t>
+              <a:t>8/1/15</a:t>
             </a:fld>
             <a:endParaRPr lang="en-GB"/>
           </a:p>
@@ -2674,7 +2676,7 @@
           <a:p>
             <a:fld id="{192B58FE-A0CE-A14C-9D3B-3409446C3BF4}" type="datetimeFigureOut">
               <a:rPr lang="en-US" smtClean="0"/>
-              <a:t>7/22/15</a:t>
+              <a:t>8/1/15</a:t>
             </a:fld>
             <a:endParaRPr lang="en-GB"/>
           </a:p>
@@ -2951,7 +2953,7 @@
           <a:p>
             <a:fld id="{192B58FE-A0CE-A14C-9D3B-3409446C3BF4}" type="datetimeFigureOut">
               <a:rPr lang="en-US" smtClean="0"/>
-              <a:t>7/22/15</a:t>
+              <a:t>8/1/15</a:t>
             </a:fld>
             <a:endParaRPr lang="en-GB"/>
           </a:p>
@@ -3204,7 +3206,7 @@
           <a:p>
             <a:fld id="{192B58FE-A0CE-A14C-9D3B-3409446C3BF4}" type="datetimeFigureOut">
               <a:rPr lang="en-US" smtClean="0"/>
-              <a:t>7/22/15</a:t>
+              <a:t>8/1/15</a:t>
             </a:fld>
             <a:endParaRPr lang="en-GB"/>
           </a:p>
@@ -3417,7 +3419,7 @@
           <a:p>
             <a:fld id="{192B58FE-A0CE-A14C-9D3B-3409446C3BF4}" type="datetimeFigureOut">
               <a:rPr lang="en-US" smtClean="0"/>
-              <a:t>7/22/15</a:t>
+              <a:t>8/1/15</a:t>
             </a:fld>
             <a:endParaRPr lang="en-GB"/>
           </a:p>
@@ -5993,7 +5995,7 @@
             <a:graphicData uri="http://schemas.openxmlformats.org/presentationml/2006/ole">
               <mc:AlternateContent xmlns:mc="http://schemas.openxmlformats.org/markup-compatibility/2006">
                 <mc:Choice xmlns:v="urn:schemas-microsoft-com:vml" Requires="v">
-                  <p:oleObj spid="_x0000_s1167" name="Equation" r:id="rId3" imgW="114300" imgH="165100" progId="Equation.DSMT4">
+                  <p:oleObj spid="_x0000_s1181" name="Equation" r:id="rId3" imgW="114300" imgH="165100" progId="Equation.DSMT4">
                     <p:embed/>
                   </p:oleObj>
                 </mc:Choice>
@@ -8341,6 +8343,4526 @@
       </p:par>
     </p:tnLst>
   </p:timing>
+</p:sld>
+</file>
+
+<file path=ppt/slides/slide10.xml><?xml version="1.0" encoding="utf-8"?>
+<p:sld xmlns:a="http://schemas.openxmlformats.org/drawingml/2006/main" xmlns:r="http://schemas.openxmlformats.org/officeDocument/2006/relationships" xmlns:p="http://schemas.openxmlformats.org/presentationml/2006/main">
+  <p:cSld>
+    <p:spTree>
+      <p:nvGrpSpPr>
+        <p:cNvPr id="1" name=""/>
+        <p:cNvGrpSpPr/>
+        <p:nvPr/>
+      </p:nvGrpSpPr>
+      <p:grpSpPr>
+        <a:xfrm>
+          <a:off x="0" y="0"/>
+          <a:ext cx="0" cy="0"/>
+          <a:chOff x="0" y="0"/>
+          <a:chExt cx="0" cy="0"/>
+        </a:xfrm>
+      </p:grpSpPr>
+      <p:sp>
+        <p:nvSpPr>
+          <p:cNvPr id="5" name="Rectangle 4"/>
+          <p:cNvSpPr/>
+          <p:nvPr/>
+        </p:nvSpPr>
+        <p:spPr>
+          <a:xfrm>
+            <a:off x="5510717" y="4291028"/>
+            <a:ext cx="2054990" cy="653054"/>
+          </a:xfrm>
+          <a:prstGeom prst="rect">
+            <a:avLst/>
+          </a:prstGeom>
+          <a:noFill/>
+          <a:ln>
+            <a:noFill/>
+          </a:ln>
+          <a:effectLst/>
+        </p:spPr>
+        <p:style>
+          <a:lnRef idx="1">
+            <a:schemeClr val="accent1"/>
+          </a:lnRef>
+          <a:fillRef idx="3">
+            <a:schemeClr val="accent1"/>
+          </a:fillRef>
+          <a:effectRef idx="2">
+            <a:schemeClr val="accent1"/>
+          </a:effectRef>
+          <a:fontRef idx="minor">
+            <a:schemeClr val="lt1"/>
+          </a:fontRef>
+        </p:style>
+        <p:txBody>
+          <a:bodyPr rtlCol="0" anchor="ctr"/>
+          <a:lstStyle/>
+          <a:p>
+            <a:pPr algn="ctr"/>
+            <a:endParaRPr lang="en-GB"/>
+          </a:p>
+        </p:txBody>
+      </p:sp>
+      <p:grpSp>
+        <p:nvGrpSpPr>
+          <p:cNvPr id="110" name="Group 109"/>
+          <p:cNvGrpSpPr/>
+          <p:nvPr/>
+        </p:nvGrpSpPr>
+        <p:grpSpPr>
+          <a:xfrm>
+            <a:off x="1094607" y="1775391"/>
+            <a:ext cx="3876424" cy="1422850"/>
+            <a:chOff x="1094607" y="1775391"/>
+            <a:chExt cx="3876424" cy="1422850"/>
+          </a:xfrm>
+        </p:grpSpPr>
+        <p:sp>
+          <p:nvSpPr>
+            <p:cNvPr id="9" name="Explosion 1 8"/>
+            <p:cNvSpPr/>
+            <p:nvPr/>
+          </p:nvSpPr>
+          <p:spPr>
+            <a:xfrm>
+              <a:off x="3836688" y="2244407"/>
+              <a:ext cx="135861" cy="135866"/>
+            </a:xfrm>
+            <a:prstGeom prst="irregularSeal1">
+              <a:avLst/>
+            </a:prstGeom>
+            <a:solidFill>
+              <a:schemeClr val="tx1">
+                <a:lumMod val="75000"/>
+                <a:lumOff val="25000"/>
+              </a:schemeClr>
+            </a:solidFill>
+            <a:ln>
+              <a:noFill/>
+            </a:ln>
+            <a:effectLst/>
+          </p:spPr>
+          <p:style>
+            <a:lnRef idx="1">
+              <a:schemeClr val="accent1"/>
+            </a:lnRef>
+            <a:fillRef idx="3">
+              <a:schemeClr val="accent1"/>
+            </a:fillRef>
+            <a:effectRef idx="2">
+              <a:schemeClr val="accent1"/>
+            </a:effectRef>
+            <a:fontRef idx="minor">
+              <a:schemeClr val="lt1"/>
+            </a:fontRef>
+          </p:style>
+          <p:txBody>
+            <a:bodyPr rtlCol="0" anchor="ctr"/>
+            <a:lstStyle/>
+            <a:p>
+              <a:pPr algn="ctr"/>
+              <a:endParaRPr lang="en-GB"/>
+            </a:p>
+          </p:txBody>
+        </p:sp>
+        <p:sp>
+          <p:nvSpPr>
+            <p:cNvPr id="10" name="Isosceles Triangle 9"/>
+            <p:cNvSpPr/>
+            <p:nvPr/>
+          </p:nvSpPr>
+          <p:spPr>
+            <a:xfrm rot="10800000">
+              <a:off x="3837944" y="2432119"/>
+              <a:ext cx="133350" cy="114957"/>
+            </a:xfrm>
+            <a:prstGeom prst="triangle">
+              <a:avLst/>
+            </a:prstGeom>
+            <a:solidFill>
+              <a:srgbClr val="0000FF"/>
+            </a:solidFill>
+            <a:ln>
+              <a:solidFill>
+                <a:schemeClr val="tx1"/>
+              </a:solidFill>
+            </a:ln>
+            <a:effectLst/>
+          </p:spPr>
+          <p:style>
+            <a:lnRef idx="1">
+              <a:schemeClr val="accent1"/>
+            </a:lnRef>
+            <a:fillRef idx="3">
+              <a:schemeClr val="accent1"/>
+            </a:fillRef>
+            <a:effectRef idx="2">
+              <a:schemeClr val="accent1"/>
+            </a:effectRef>
+            <a:fontRef idx="minor">
+              <a:schemeClr val="lt1"/>
+            </a:fontRef>
+          </p:style>
+          <p:txBody>
+            <a:bodyPr rtlCol="0" anchor="ctr"/>
+            <a:lstStyle/>
+            <a:p>
+              <a:pPr algn="ctr"/>
+              <a:endParaRPr lang="en-GB"/>
+            </a:p>
+          </p:txBody>
+        </p:sp>
+        <p:sp>
+          <p:nvSpPr>
+            <p:cNvPr id="11" name="TextBox 10"/>
+            <p:cNvSpPr txBox="1"/>
+            <p:nvPr/>
+          </p:nvSpPr>
+          <p:spPr>
+            <a:xfrm>
+              <a:off x="3910642" y="2201549"/>
+              <a:ext cx="1060389" cy="215444"/>
+            </a:xfrm>
+            <a:prstGeom prst="rect">
+              <a:avLst/>
+            </a:prstGeom>
+            <a:noFill/>
+          </p:spPr>
+          <p:txBody>
+            <a:bodyPr wrap="square" rtlCol="0">
+              <a:spAutoFit/>
+            </a:bodyPr>
+            <a:lstStyle/>
+            <a:p>
+              <a:r>
+                <a:rPr lang="en-GB" sz="800" dirty="0" smtClean="0">
+                  <a:latin typeface="Times New Roman"/>
+                  <a:cs typeface="Times New Roman"/>
+                </a:rPr>
+                <a:t>Source</a:t>
+              </a:r>
+              <a:endParaRPr lang="en-GB" sz="800" dirty="0">
+                <a:latin typeface="Times New Roman"/>
+                <a:cs typeface="Times New Roman"/>
+              </a:endParaRPr>
+            </a:p>
+          </p:txBody>
+        </p:sp>
+        <p:sp>
+          <p:nvSpPr>
+            <p:cNvPr id="12" name="TextBox 11"/>
+            <p:cNvSpPr txBox="1"/>
+            <p:nvPr/>
+          </p:nvSpPr>
+          <p:spPr>
+            <a:xfrm>
+              <a:off x="3910642" y="2376277"/>
+              <a:ext cx="1060389" cy="215444"/>
+            </a:xfrm>
+            <a:prstGeom prst="rect">
+              <a:avLst/>
+            </a:prstGeom>
+            <a:noFill/>
+          </p:spPr>
+          <p:txBody>
+            <a:bodyPr wrap="square" rtlCol="0">
+              <a:spAutoFit/>
+            </a:bodyPr>
+            <a:lstStyle/>
+            <a:p>
+              <a:r>
+                <a:rPr lang="en-GB" sz="800" dirty="0" smtClean="0">
+                  <a:latin typeface="Times New Roman"/>
+                  <a:cs typeface="Times New Roman"/>
+                </a:rPr>
+                <a:t>Receiver</a:t>
+              </a:r>
+              <a:endParaRPr lang="en-GB" sz="800" dirty="0">
+                <a:latin typeface="Times New Roman"/>
+                <a:cs typeface="Times New Roman"/>
+              </a:endParaRPr>
+            </a:p>
+          </p:txBody>
+        </p:sp>
+        <p:cxnSp>
+          <p:nvCxnSpPr>
+            <p:cNvPr id="23" name="Straight Arrow Connector 22"/>
+            <p:cNvCxnSpPr/>
+            <p:nvPr/>
+          </p:nvCxnSpPr>
+          <p:spPr>
+            <a:xfrm>
+              <a:off x="1581711" y="2171700"/>
+              <a:ext cx="0" cy="1016000"/>
+            </a:xfrm>
+            <a:prstGeom prst="straightConnector1">
+              <a:avLst/>
+            </a:prstGeom>
+            <a:ln>
+              <a:solidFill>
+                <a:srgbClr val="000000"/>
+              </a:solidFill>
+              <a:tailEnd type="arrow"/>
+            </a:ln>
+            <a:effectLst/>
+          </p:spPr>
+          <p:style>
+            <a:lnRef idx="2">
+              <a:schemeClr val="accent1"/>
+            </a:lnRef>
+            <a:fillRef idx="0">
+              <a:schemeClr val="accent1"/>
+            </a:fillRef>
+            <a:effectRef idx="1">
+              <a:schemeClr val="accent1"/>
+            </a:effectRef>
+            <a:fontRef idx="minor">
+              <a:schemeClr val="tx1"/>
+            </a:fontRef>
+          </p:style>
+        </p:cxnSp>
+        <p:sp>
+          <p:nvSpPr>
+            <p:cNvPr id="107" name="TextBox 106"/>
+            <p:cNvSpPr txBox="1"/>
+            <p:nvPr/>
+          </p:nvSpPr>
+          <p:spPr>
+            <a:xfrm rot="5400000">
+              <a:off x="1489967" y="2445643"/>
+              <a:ext cx="336550" cy="369332"/>
+            </a:xfrm>
+            <a:prstGeom prst="rect">
+              <a:avLst/>
+            </a:prstGeom>
+            <a:solidFill>
+              <a:schemeClr val="bg1"/>
+            </a:solidFill>
+          </p:spPr>
+          <p:txBody>
+            <a:bodyPr wrap="square" rtlCol="0">
+              <a:spAutoFit/>
+            </a:bodyPr>
+            <a:lstStyle/>
+            <a:p>
+              <a:r>
+                <a:rPr lang="en-GB" dirty="0" smtClean="0"/>
+                <a:t>…</a:t>
+              </a:r>
+              <a:endParaRPr lang="en-GB" dirty="0"/>
+            </a:p>
+          </p:txBody>
+        </p:sp>
+        <p:sp>
+          <p:nvSpPr>
+            <p:cNvPr id="82" name="Explosion 1 81"/>
+            <p:cNvSpPr/>
+            <p:nvPr/>
+          </p:nvSpPr>
+          <p:spPr>
+            <a:xfrm>
+              <a:off x="1759283" y="2248319"/>
+              <a:ext cx="135861" cy="135866"/>
+            </a:xfrm>
+            <a:prstGeom prst="irregularSeal1">
+              <a:avLst/>
+            </a:prstGeom>
+            <a:solidFill>
+              <a:schemeClr val="tx1">
+                <a:lumMod val="75000"/>
+                <a:lumOff val="25000"/>
+              </a:schemeClr>
+            </a:solidFill>
+            <a:ln>
+              <a:noFill/>
+            </a:ln>
+            <a:effectLst/>
+          </p:spPr>
+          <p:style>
+            <a:lnRef idx="1">
+              <a:schemeClr val="accent1"/>
+            </a:lnRef>
+            <a:fillRef idx="3">
+              <a:schemeClr val="accent1"/>
+            </a:fillRef>
+            <a:effectRef idx="2">
+              <a:schemeClr val="accent1"/>
+            </a:effectRef>
+            <a:fontRef idx="minor">
+              <a:schemeClr val="lt1"/>
+            </a:fontRef>
+          </p:style>
+          <p:txBody>
+            <a:bodyPr rtlCol="0" anchor="ctr"/>
+            <a:lstStyle/>
+            <a:p>
+              <a:pPr algn="ctr"/>
+              <a:endParaRPr lang="en-GB"/>
+            </a:p>
+          </p:txBody>
+        </p:sp>
+        <p:sp>
+          <p:nvSpPr>
+            <p:cNvPr id="85" name="Explosion 1 84"/>
+            <p:cNvSpPr/>
+            <p:nvPr/>
+          </p:nvSpPr>
+          <p:spPr>
+            <a:xfrm>
+              <a:off x="1759283" y="2363158"/>
+              <a:ext cx="135861" cy="135866"/>
+            </a:xfrm>
+            <a:prstGeom prst="irregularSeal1">
+              <a:avLst/>
+            </a:prstGeom>
+            <a:solidFill>
+              <a:schemeClr val="tx1">
+                <a:lumMod val="75000"/>
+                <a:lumOff val="25000"/>
+              </a:schemeClr>
+            </a:solidFill>
+            <a:ln>
+              <a:noFill/>
+            </a:ln>
+            <a:effectLst/>
+          </p:spPr>
+          <p:style>
+            <a:lnRef idx="1">
+              <a:schemeClr val="accent1"/>
+            </a:lnRef>
+            <a:fillRef idx="3">
+              <a:schemeClr val="accent1"/>
+            </a:fillRef>
+            <a:effectRef idx="2">
+              <a:schemeClr val="accent1"/>
+            </a:effectRef>
+            <a:fontRef idx="minor">
+              <a:schemeClr val="lt1"/>
+            </a:fontRef>
+          </p:style>
+          <p:txBody>
+            <a:bodyPr rtlCol="0" anchor="ctr"/>
+            <a:lstStyle/>
+            <a:p>
+              <a:pPr algn="ctr"/>
+              <a:endParaRPr lang="en-GB"/>
+            </a:p>
+          </p:txBody>
+        </p:sp>
+        <p:sp>
+          <p:nvSpPr>
+            <p:cNvPr id="99" name="Explosion 1 98"/>
+            <p:cNvSpPr/>
+            <p:nvPr/>
+          </p:nvSpPr>
+          <p:spPr>
+            <a:xfrm>
+              <a:off x="1759283" y="2772910"/>
+              <a:ext cx="135861" cy="135866"/>
+            </a:xfrm>
+            <a:prstGeom prst="irregularSeal1">
+              <a:avLst/>
+            </a:prstGeom>
+            <a:solidFill>
+              <a:schemeClr val="tx1">
+                <a:lumMod val="75000"/>
+                <a:lumOff val="25000"/>
+              </a:schemeClr>
+            </a:solidFill>
+            <a:ln>
+              <a:noFill/>
+            </a:ln>
+            <a:effectLst/>
+          </p:spPr>
+          <p:style>
+            <a:lnRef idx="1">
+              <a:schemeClr val="accent1"/>
+            </a:lnRef>
+            <a:fillRef idx="3">
+              <a:schemeClr val="accent1"/>
+            </a:fillRef>
+            <a:effectRef idx="2">
+              <a:schemeClr val="accent1"/>
+            </a:effectRef>
+            <a:fontRef idx="minor">
+              <a:schemeClr val="lt1"/>
+            </a:fontRef>
+          </p:style>
+          <p:txBody>
+            <a:bodyPr rtlCol="0" anchor="ctr"/>
+            <a:lstStyle/>
+            <a:p>
+              <a:pPr algn="ctr"/>
+              <a:endParaRPr lang="en-GB"/>
+            </a:p>
+          </p:txBody>
+        </p:sp>
+        <p:sp>
+          <p:nvSpPr>
+            <p:cNvPr id="102" name="Explosion 1 101"/>
+            <p:cNvSpPr/>
+            <p:nvPr/>
+          </p:nvSpPr>
+          <p:spPr>
+            <a:xfrm>
+              <a:off x="1759283" y="2887752"/>
+              <a:ext cx="135861" cy="135866"/>
+            </a:xfrm>
+            <a:prstGeom prst="irregularSeal1">
+              <a:avLst/>
+            </a:prstGeom>
+            <a:solidFill>
+              <a:schemeClr val="tx1">
+                <a:lumMod val="75000"/>
+                <a:lumOff val="25000"/>
+              </a:schemeClr>
+            </a:solidFill>
+            <a:ln>
+              <a:noFill/>
+            </a:ln>
+            <a:effectLst/>
+          </p:spPr>
+          <p:style>
+            <a:lnRef idx="1">
+              <a:schemeClr val="accent1"/>
+            </a:lnRef>
+            <a:fillRef idx="3">
+              <a:schemeClr val="accent1"/>
+            </a:fillRef>
+            <a:effectRef idx="2">
+              <a:schemeClr val="accent1"/>
+            </a:effectRef>
+            <a:fontRef idx="minor">
+              <a:schemeClr val="lt1"/>
+            </a:fontRef>
+          </p:style>
+          <p:txBody>
+            <a:bodyPr rtlCol="0" anchor="ctr"/>
+            <a:lstStyle/>
+            <a:p>
+              <a:pPr algn="ctr"/>
+              <a:endParaRPr lang="en-GB"/>
+            </a:p>
+          </p:txBody>
+        </p:sp>
+        <p:sp>
+          <p:nvSpPr>
+            <p:cNvPr id="61" name="Explosion 1 60"/>
+            <p:cNvSpPr/>
+            <p:nvPr/>
+          </p:nvSpPr>
+          <p:spPr>
+            <a:xfrm>
+              <a:off x="1893588" y="2248319"/>
+              <a:ext cx="135861" cy="135866"/>
+            </a:xfrm>
+            <a:prstGeom prst="irregularSeal1">
+              <a:avLst/>
+            </a:prstGeom>
+            <a:solidFill>
+              <a:schemeClr val="tx1">
+                <a:lumMod val="75000"/>
+                <a:lumOff val="25000"/>
+              </a:schemeClr>
+            </a:solidFill>
+            <a:ln>
+              <a:noFill/>
+            </a:ln>
+            <a:effectLst/>
+          </p:spPr>
+          <p:style>
+            <a:lnRef idx="1">
+              <a:schemeClr val="accent1"/>
+            </a:lnRef>
+            <a:fillRef idx="3">
+              <a:schemeClr val="accent1"/>
+            </a:fillRef>
+            <a:effectRef idx="2">
+              <a:schemeClr val="accent1"/>
+            </a:effectRef>
+            <a:fontRef idx="minor">
+              <a:schemeClr val="lt1"/>
+            </a:fontRef>
+          </p:style>
+          <p:txBody>
+            <a:bodyPr rtlCol="0" anchor="ctr"/>
+            <a:lstStyle/>
+            <a:p>
+              <a:pPr algn="ctr"/>
+              <a:endParaRPr lang="en-GB"/>
+            </a:p>
+          </p:txBody>
+        </p:sp>
+        <p:sp>
+          <p:nvSpPr>
+            <p:cNvPr id="64" name="Explosion 1 63"/>
+            <p:cNvSpPr/>
+            <p:nvPr/>
+          </p:nvSpPr>
+          <p:spPr>
+            <a:xfrm>
+              <a:off x="1893588" y="2363158"/>
+              <a:ext cx="135861" cy="135866"/>
+            </a:xfrm>
+            <a:prstGeom prst="irregularSeal1">
+              <a:avLst/>
+            </a:prstGeom>
+            <a:solidFill>
+              <a:schemeClr val="tx1">
+                <a:lumMod val="75000"/>
+                <a:lumOff val="25000"/>
+              </a:schemeClr>
+            </a:solidFill>
+            <a:ln>
+              <a:noFill/>
+            </a:ln>
+            <a:effectLst/>
+          </p:spPr>
+          <p:style>
+            <a:lnRef idx="1">
+              <a:schemeClr val="accent1"/>
+            </a:lnRef>
+            <a:fillRef idx="3">
+              <a:schemeClr val="accent1"/>
+            </a:fillRef>
+            <a:effectRef idx="2">
+              <a:schemeClr val="accent1"/>
+            </a:effectRef>
+            <a:fontRef idx="minor">
+              <a:schemeClr val="lt1"/>
+            </a:fontRef>
+          </p:style>
+          <p:txBody>
+            <a:bodyPr rtlCol="0" anchor="ctr"/>
+            <a:lstStyle/>
+            <a:p>
+              <a:pPr algn="ctr"/>
+              <a:endParaRPr lang="en-GB"/>
+            </a:p>
+          </p:txBody>
+        </p:sp>
+        <p:sp>
+          <p:nvSpPr>
+            <p:cNvPr id="78" name="Explosion 1 77"/>
+            <p:cNvSpPr/>
+            <p:nvPr/>
+          </p:nvSpPr>
+          <p:spPr>
+            <a:xfrm>
+              <a:off x="1893588" y="2772910"/>
+              <a:ext cx="135861" cy="135866"/>
+            </a:xfrm>
+            <a:prstGeom prst="irregularSeal1">
+              <a:avLst/>
+            </a:prstGeom>
+            <a:solidFill>
+              <a:schemeClr val="tx1">
+                <a:lumMod val="75000"/>
+                <a:lumOff val="25000"/>
+              </a:schemeClr>
+            </a:solidFill>
+            <a:ln>
+              <a:noFill/>
+            </a:ln>
+            <a:effectLst/>
+          </p:spPr>
+          <p:style>
+            <a:lnRef idx="1">
+              <a:schemeClr val="accent1"/>
+            </a:lnRef>
+            <a:fillRef idx="3">
+              <a:schemeClr val="accent1"/>
+            </a:fillRef>
+            <a:effectRef idx="2">
+              <a:schemeClr val="accent1"/>
+            </a:effectRef>
+            <a:fontRef idx="minor">
+              <a:schemeClr val="lt1"/>
+            </a:fontRef>
+          </p:style>
+          <p:txBody>
+            <a:bodyPr rtlCol="0" anchor="ctr"/>
+            <a:lstStyle/>
+            <a:p>
+              <a:pPr algn="ctr"/>
+              <a:endParaRPr lang="en-GB"/>
+            </a:p>
+          </p:txBody>
+        </p:sp>
+        <p:sp>
+          <p:nvSpPr>
+            <p:cNvPr id="81" name="Explosion 1 80"/>
+            <p:cNvSpPr/>
+            <p:nvPr/>
+          </p:nvSpPr>
+          <p:spPr>
+            <a:xfrm>
+              <a:off x="1893588" y="2887752"/>
+              <a:ext cx="135861" cy="135866"/>
+            </a:xfrm>
+            <a:prstGeom prst="irregularSeal1">
+              <a:avLst/>
+            </a:prstGeom>
+            <a:solidFill>
+              <a:schemeClr val="tx1">
+                <a:lumMod val="75000"/>
+                <a:lumOff val="25000"/>
+              </a:schemeClr>
+            </a:solidFill>
+            <a:ln>
+              <a:noFill/>
+            </a:ln>
+            <a:effectLst/>
+          </p:spPr>
+          <p:style>
+            <a:lnRef idx="1">
+              <a:schemeClr val="accent1"/>
+            </a:lnRef>
+            <a:fillRef idx="3">
+              <a:schemeClr val="accent1"/>
+            </a:fillRef>
+            <a:effectRef idx="2">
+              <a:schemeClr val="accent1"/>
+            </a:effectRef>
+            <a:fontRef idx="minor">
+              <a:schemeClr val="lt1"/>
+            </a:fontRef>
+          </p:style>
+          <p:txBody>
+            <a:bodyPr rtlCol="0" anchor="ctr"/>
+            <a:lstStyle/>
+            <a:p>
+              <a:pPr algn="ctr"/>
+              <a:endParaRPr lang="en-GB"/>
+            </a:p>
+          </p:txBody>
+        </p:sp>
+        <p:sp>
+          <p:nvSpPr>
+            <p:cNvPr id="40" name="Explosion 1 39"/>
+            <p:cNvSpPr/>
+            <p:nvPr/>
+          </p:nvSpPr>
+          <p:spPr>
+            <a:xfrm>
+              <a:off x="3322338" y="2248319"/>
+              <a:ext cx="135861" cy="135866"/>
+            </a:xfrm>
+            <a:prstGeom prst="irregularSeal1">
+              <a:avLst/>
+            </a:prstGeom>
+            <a:solidFill>
+              <a:schemeClr val="tx1">
+                <a:lumMod val="75000"/>
+                <a:lumOff val="25000"/>
+              </a:schemeClr>
+            </a:solidFill>
+            <a:ln>
+              <a:noFill/>
+            </a:ln>
+            <a:effectLst/>
+          </p:spPr>
+          <p:style>
+            <a:lnRef idx="1">
+              <a:schemeClr val="accent1"/>
+            </a:lnRef>
+            <a:fillRef idx="3">
+              <a:schemeClr val="accent1"/>
+            </a:fillRef>
+            <a:effectRef idx="2">
+              <a:schemeClr val="accent1"/>
+            </a:effectRef>
+            <a:fontRef idx="minor">
+              <a:schemeClr val="lt1"/>
+            </a:fontRef>
+          </p:style>
+          <p:txBody>
+            <a:bodyPr rtlCol="0" anchor="ctr"/>
+            <a:lstStyle/>
+            <a:p>
+              <a:pPr algn="ctr"/>
+              <a:endParaRPr lang="en-GB"/>
+            </a:p>
+          </p:txBody>
+        </p:sp>
+        <p:sp>
+          <p:nvSpPr>
+            <p:cNvPr id="43" name="Explosion 1 42"/>
+            <p:cNvSpPr/>
+            <p:nvPr/>
+          </p:nvSpPr>
+          <p:spPr>
+            <a:xfrm>
+              <a:off x="3322338" y="2363158"/>
+              <a:ext cx="135861" cy="135866"/>
+            </a:xfrm>
+            <a:prstGeom prst="irregularSeal1">
+              <a:avLst/>
+            </a:prstGeom>
+            <a:solidFill>
+              <a:schemeClr val="tx1">
+                <a:lumMod val="75000"/>
+                <a:lumOff val="25000"/>
+              </a:schemeClr>
+            </a:solidFill>
+            <a:ln>
+              <a:noFill/>
+            </a:ln>
+            <a:effectLst/>
+          </p:spPr>
+          <p:style>
+            <a:lnRef idx="1">
+              <a:schemeClr val="accent1"/>
+            </a:lnRef>
+            <a:fillRef idx="3">
+              <a:schemeClr val="accent1"/>
+            </a:fillRef>
+            <a:effectRef idx="2">
+              <a:schemeClr val="accent1"/>
+            </a:effectRef>
+            <a:fontRef idx="minor">
+              <a:schemeClr val="lt1"/>
+            </a:fontRef>
+          </p:style>
+          <p:txBody>
+            <a:bodyPr rtlCol="0" anchor="ctr"/>
+            <a:lstStyle/>
+            <a:p>
+              <a:pPr algn="ctr"/>
+              <a:endParaRPr lang="en-GB"/>
+            </a:p>
+          </p:txBody>
+        </p:sp>
+        <p:sp>
+          <p:nvSpPr>
+            <p:cNvPr id="57" name="Explosion 1 56"/>
+            <p:cNvSpPr/>
+            <p:nvPr/>
+          </p:nvSpPr>
+          <p:spPr>
+            <a:xfrm>
+              <a:off x="3322338" y="2772910"/>
+              <a:ext cx="135861" cy="135866"/>
+            </a:xfrm>
+            <a:prstGeom prst="irregularSeal1">
+              <a:avLst/>
+            </a:prstGeom>
+            <a:solidFill>
+              <a:schemeClr val="tx1">
+                <a:lumMod val="75000"/>
+                <a:lumOff val="25000"/>
+              </a:schemeClr>
+            </a:solidFill>
+            <a:ln>
+              <a:noFill/>
+            </a:ln>
+            <a:effectLst/>
+          </p:spPr>
+          <p:style>
+            <a:lnRef idx="1">
+              <a:schemeClr val="accent1"/>
+            </a:lnRef>
+            <a:fillRef idx="3">
+              <a:schemeClr val="accent1"/>
+            </a:fillRef>
+            <a:effectRef idx="2">
+              <a:schemeClr val="accent1"/>
+            </a:effectRef>
+            <a:fontRef idx="minor">
+              <a:schemeClr val="lt1"/>
+            </a:fontRef>
+          </p:style>
+          <p:txBody>
+            <a:bodyPr rtlCol="0" anchor="ctr"/>
+            <a:lstStyle/>
+            <a:p>
+              <a:pPr algn="ctr"/>
+              <a:endParaRPr lang="en-GB"/>
+            </a:p>
+          </p:txBody>
+        </p:sp>
+        <p:sp>
+          <p:nvSpPr>
+            <p:cNvPr id="60" name="Explosion 1 59"/>
+            <p:cNvSpPr/>
+            <p:nvPr/>
+          </p:nvSpPr>
+          <p:spPr>
+            <a:xfrm>
+              <a:off x="3322338" y="2887752"/>
+              <a:ext cx="135861" cy="135866"/>
+            </a:xfrm>
+            <a:prstGeom prst="irregularSeal1">
+              <a:avLst/>
+            </a:prstGeom>
+            <a:solidFill>
+              <a:schemeClr val="tx1">
+                <a:lumMod val="75000"/>
+                <a:lumOff val="25000"/>
+              </a:schemeClr>
+            </a:solidFill>
+            <a:ln>
+              <a:noFill/>
+            </a:ln>
+            <a:effectLst/>
+          </p:spPr>
+          <p:style>
+            <a:lnRef idx="1">
+              <a:schemeClr val="accent1"/>
+            </a:lnRef>
+            <a:fillRef idx="3">
+              <a:schemeClr val="accent1"/>
+            </a:fillRef>
+            <a:effectRef idx="2">
+              <a:schemeClr val="accent1"/>
+            </a:effectRef>
+            <a:fontRef idx="minor">
+              <a:schemeClr val="lt1"/>
+            </a:fontRef>
+          </p:style>
+          <p:txBody>
+            <a:bodyPr rtlCol="0" anchor="ctr"/>
+            <a:lstStyle/>
+            <a:p>
+              <a:pPr algn="ctr"/>
+              <a:endParaRPr lang="en-GB"/>
+            </a:p>
+          </p:txBody>
+        </p:sp>
+        <p:sp>
+          <p:nvSpPr>
+            <p:cNvPr id="19" name="TextBox 18"/>
+            <p:cNvSpPr txBox="1"/>
+            <p:nvPr/>
+          </p:nvSpPr>
+          <p:spPr>
+            <a:xfrm>
+              <a:off x="2512317" y="2044603"/>
+              <a:ext cx="336550" cy="369332"/>
+            </a:xfrm>
+            <a:prstGeom prst="rect">
+              <a:avLst/>
+            </a:prstGeom>
+            <a:noFill/>
+          </p:spPr>
+          <p:txBody>
+            <a:bodyPr wrap="square" rtlCol="0">
+              <a:spAutoFit/>
+            </a:bodyPr>
+            <a:lstStyle/>
+            <a:p>
+              <a:r>
+                <a:rPr lang="en-GB" dirty="0" smtClean="0"/>
+                <a:t>…</a:t>
+              </a:r>
+              <a:endParaRPr lang="en-GB" dirty="0"/>
+            </a:p>
+          </p:txBody>
+        </p:sp>
+        <p:sp>
+          <p:nvSpPr>
+            <p:cNvPr id="20" name="TextBox 19"/>
+            <p:cNvSpPr txBox="1"/>
+            <p:nvPr/>
+          </p:nvSpPr>
+          <p:spPr>
+            <a:xfrm>
+              <a:off x="2512317" y="2686971"/>
+              <a:ext cx="336550" cy="369332"/>
+            </a:xfrm>
+            <a:prstGeom prst="rect">
+              <a:avLst/>
+            </a:prstGeom>
+            <a:noFill/>
+          </p:spPr>
+          <p:txBody>
+            <a:bodyPr wrap="square" rtlCol="0">
+              <a:spAutoFit/>
+            </a:bodyPr>
+            <a:lstStyle/>
+            <a:p>
+              <a:r>
+                <a:rPr lang="en-GB" dirty="0" smtClean="0"/>
+                <a:t>…</a:t>
+              </a:r>
+              <a:endParaRPr lang="en-GB" dirty="0"/>
+            </a:p>
+          </p:txBody>
+        </p:sp>
+        <p:sp>
+          <p:nvSpPr>
+            <p:cNvPr id="22" name="Isosceles Triangle 21"/>
+            <p:cNvSpPr/>
+            <p:nvPr/>
+          </p:nvSpPr>
+          <p:spPr>
+            <a:xfrm rot="10800000">
+              <a:off x="1757955" y="2262878"/>
+              <a:ext cx="133350" cy="114957"/>
+            </a:xfrm>
+            <a:prstGeom prst="triangle">
+              <a:avLst/>
+            </a:prstGeom>
+            <a:solidFill>
+              <a:srgbClr val="0000FF"/>
+            </a:solidFill>
+            <a:ln>
+              <a:solidFill>
+                <a:schemeClr val="tx1"/>
+              </a:solidFill>
+            </a:ln>
+            <a:effectLst/>
+          </p:spPr>
+          <p:style>
+            <a:lnRef idx="1">
+              <a:schemeClr val="accent1"/>
+            </a:lnRef>
+            <a:fillRef idx="3">
+              <a:schemeClr val="accent1"/>
+            </a:fillRef>
+            <a:effectRef idx="2">
+              <a:schemeClr val="accent1"/>
+            </a:effectRef>
+            <a:fontRef idx="minor">
+              <a:schemeClr val="lt1"/>
+            </a:fontRef>
+          </p:style>
+          <p:txBody>
+            <a:bodyPr rtlCol="0" anchor="ctr"/>
+            <a:lstStyle/>
+            <a:p>
+              <a:pPr algn="ctr"/>
+              <a:endParaRPr lang="en-GB"/>
+            </a:p>
+          </p:txBody>
+        </p:sp>
+        <p:cxnSp>
+          <p:nvCxnSpPr>
+            <p:cNvPr id="24" name="Straight Arrow Connector 23"/>
+            <p:cNvCxnSpPr/>
+            <p:nvPr/>
+          </p:nvCxnSpPr>
+          <p:spPr>
+            <a:xfrm>
+              <a:off x="1575361" y="2178050"/>
+              <a:ext cx="2078209" cy="0"/>
+            </a:xfrm>
+            <a:prstGeom prst="straightConnector1">
+              <a:avLst/>
+            </a:prstGeom>
+            <a:ln>
+              <a:solidFill>
+                <a:srgbClr val="000000"/>
+              </a:solidFill>
+              <a:tailEnd type="arrow"/>
+            </a:ln>
+            <a:effectLst/>
+          </p:spPr>
+          <p:style>
+            <a:lnRef idx="2">
+              <a:schemeClr val="accent1"/>
+            </a:lnRef>
+            <a:fillRef idx="0">
+              <a:schemeClr val="accent1"/>
+            </a:fillRef>
+            <a:effectRef idx="1">
+              <a:schemeClr val="accent1"/>
+            </a:effectRef>
+            <a:fontRef idx="minor">
+              <a:schemeClr val="tx1"/>
+            </a:fontRef>
+          </p:style>
+        </p:cxnSp>
+        <p:cxnSp>
+          <p:nvCxnSpPr>
+            <p:cNvPr id="25" name="Straight Connector 24"/>
+            <p:cNvCxnSpPr/>
+            <p:nvPr/>
+          </p:nvCxnSpPr>
+          <p:spPr>
+            <a:xfrm>
+              <a:off x="1826186" y="2132012"/>
+              <a:ext cx="0" cy="88900"/>
+            </a:xfrm>
+            <a:prstGeom prst="line">
+              <a:avLst/>
+            </a:prstGeom>
+            <a:ln>
+              <a:solidFill>
+                <a:schemeClr val="tx1"/>
+              </a:solidFill>
+            </a:ln>
+            <a:effectLst/>
+          </p:spPr>
+          <p:style>
+            <a:lnRef idx="2">
+              <a:schemeClr val="accent1"/>
+            </a:lnRef>
+            <a:fillRef idx="0">
+              <a:schemeClr val="accent1"/>
+            </a:fillRef>
+            <a:effectRef idx="1">
+              <a:schemeClr val="accent1"/>
+            </a:effectRef>
+            <a:fontRef idx="minor">
+              <a:schemeClr val="tx1"/>
+            </a:fontRef>
+          </p:style>
+        </p:cxnSp>
+        <p:cxnSp>
+          <p:nvCxnSpPr>
+            <p:cNvPr id="26" name="Straight Connector 25"/>
+            <p:cNvCxnSpPr/>
+            <p:nvPr/>
+          </p:nvCxnSpPr>
+          <p:spPr>
+            <a:xfrm>
+              <a:off x="1953186" y="2132012"/>
+              <a:ext cx="0" cy="88900"/>
+            </a:xfrm>
+            <a:prstGeom prst="line">
+              <a:avLst/>
+            </a:prstGeom>
+            <a:ln>
+              <a:solidFill>
+                <a:schemeClr val="tx1"/>
+              </a:solidFill>
+            </a:ln>
+            <a:effectLst/>
+          </p:spPr>
+          <p:style>
+            <a:lnRef idx="2">
+              <a:schemeClr val="accent1"/>
+            </a:lnRef>
+            <a:fillRef idx="0">
+              <a:schemeClr val="accent1"/>
+            </a:fillRef>
+            <a:effectRef idx="1">
+              <a:schemeClr val="accent1"/>
+            </a:effectRef>
+            <a:fontRef idx="minor">
+              <a:schemeClr val="tx1"/>
+            </a:fontRef>
+          </p:style>
+        </p:cxnSp>
+        <p:cxnSp>
+          <p:nvCxnSpPr>
+            <p:cNvPr id="27" name="Straight Connector 26"/>
+            <p:cNvCxnSpPr/>
+            <p:nvPr/>
+          </p:nvCxnSpPr>
+          <p:spPr>
+            <a:xfrm>
+              <a:off x="3388286" y="2132012"/>
+              <a:ext cx="0" cy="88900"/>
+            </a:xfrm>
+            <a:prstGeom prst="line">
+              <a:avLst/>
+            </a:prstGeom>
+            <a:ln>
+              <a:solidFill>
+                <a:schemeClr val="tx1"/>
+              </a:solidFill>
+            </a:ln>
+            <a:effectLst/>
+          </p:spPr>
+          <p:style>
+            <a:lnRef idx="2">
+              <a:schemeClr val="accent1"/>
+            </a:lnRef>
+            <a:fillRef idx="0">
+              <a:schemeClr val="accent1"/>
+            </a:fillRef>
+            <a:effectRef idx="1">
+              <a:schemeClr val="accent1"/>
+            </a:effectRef>
+            <a:fontRef idx="minor">
+              <a:schemeClr val="tx1"/>
+            </a:fontRef>
+          </p:style>
+        </p:cxnSp>
+        <p:cxnSp>
+          <p:nvCxnSpPr>
+            <p:cNvPr id="28" name="Straight Connector 27"/>
+            <p:cNvCxnSpPr/>
+            <p:nvPr/>
+          </p:nvCxnSpPr>
+          <p:spPr>
+            <a:xfrm rot="16200000">
+              <a:off x="1578868" y="2261981"/>
+              <a:ext cx="0" cy="88900"/>
+            </a:xfrm>
+            <a:prstGeom prst="line">
+              <a:avLst/>
+            </a:prstGeom>
+            <a:ln>
+              <a:solidFill>
+                <a:schemeClr val="tx1"/>
+              </a:solidFill>
+            </a:ln>
+            <a:effectLst/>
+          </p:spPr>
+          <p:style>
+            <a:lnRef idx="2">
+              <a:schemeClr val="accent1"/>
+            </a:lnRef>
+            <a:fillRef idx="0">
+              <a:schemeClr val="accent1"/>
+            </a:fillRef>
+            <a:effectRef idx="1">
+              <a:schemeClr val="accent1"/>
+            </a:effectRef>
+            <a:fontRef idx="minor">
+              <a:schemeClr val="tx1"/>
+            </a:fontRef>
+          </p:style>
+        </p:cxnSp>
+        <p:cxnSp>
+          <p:nvCxnSpPr>
+            <p:cNvPr id="29" name="Straight Connector 28"/>
+            <p:cNvCxnSpPr/>
+            <p:nvPr/>
+          </p:nvCxnSpPr>
+          <p:spPr>
+            <a:xfrm rot="16200000">
+              <a:off x="1578868" y="2385806"/>
+              <a:ext cx="0" cy="88900"/>
+            </a:xfrm>
+            <a:prstGeom prst="line">
+              <a:avLst/>
+            </a:prstGeom>
+            <a:ln>
+              <a:solidFill>
+                <a:schemeClr val="tx1"/>
+              </a:solidFill>
+            </a:ln>
+            <a:effectLst/>
+          </p:spPr>
+          <p:style>
+            <a:lnRef idx="2">
+              <a:schemeClr val="accent1"/>
+            </a:lnRef>
+            <a:fillRef idx="0">
+              <a:schemeClr val="accent1"/>
+            </a:fillRef>
+            <a:effectRef idx="1">
+              <a:schemeClr val="accent1"/>
+            </a:effectRef>
+            <a:fontRef idx="minor">
+              <a:schemeClr val="tx1"/>
+            </a:fontRef>
+          </p:style>
+        </p:cxnSp>
+        <p:cxnSp>
+          <p:nvCxnSpPr>
+            <p:cNvPr id="30" name="Straight Connector 29"/>
+            <p:cNvCxnSpPr/>
+            <p:nvPr/>
+          </p:nvCxnSpPr>
+          <p:spPr>
+            <a:xfrm rot="16200000">
+              <a:off x="1578868" y="2916031"/>
+              <a:ext cx="0" cy="88900"/>
+            </a:xfrm>
+            <a:prstGeom prst="line">
+              <a:avLst/>
+            </a:prstGeom>
+            <a:ln>
+              <a:solidFill>
+                <a:schemeClr val="tx1"/>
+              </a:solidFill>
+            </a:ln>
+            <a:effectLst/>
+          </p:spPr>
+          <p:style>
+            <a:lnRef idx="2">
+              <a:schemeClr val="accent1"/>
+            </a:lnRef>
+            <a:fillRef idx="0">
+              <a:schemeClr val="accent1"/>
+            </a:fillRef>
+            <a:effectRef idx="1">
+              <a:schemeClr val="accent1"/>
+            </a:effectRef>
+            <a:fontRef idx="minor">
+              <a:schemeClr val="tx1"/>
+            </a:fontRef>
+          </p:style>
+        </p:cxnSp>
+        <p:sp>
+          <p:nvSpPr>
+            <p:cNvPr id="31" name="TextBox 30"/>
+            <p:cNvSpPr txBox="1"/>
+            <p:nvPr/>
+          </p:nvSpPr>
+          <p:spPr>
+            <a:xfrm>
+              <a:off x="2512713" y="1912234"/>
+              <a:ext cx="336550" cy="369332"/>
+            </a:xfrm>
+            <a:prstGeom prst="rect">
+              <a:avLst/>
+            </a:prstGeom>
+            <a:solidFill>
+              <a:schemeClr val="bg1"/>
+            </a:solidFill>
+          </p:spPr>
+          <p:txBody>
+            <a:bodyPr wrap="square" rtlCol="0">
+              <a:spAutoFit/>
+            </a:bodyPr>
+            <a:lstStyle/>
+            <a:p>
+              <a:r>
+                <a:rPr lang="en-GB" dirty="0" smtClean="0"/>
+                <a:t>…</a:t>
+              </a:r>
+              <a:endParaRPr lang="en-GB" dirty="0"/>
+            </a:p>
+          </p:txBody>
+        </p:sp>
+        <p:sp>
+          <p:nvSpPr>
+            <p:cNvPr id="32" name="TextBox 31"/>
+            <p:cNvSpPr txBox="1"/>
+            <p:nvPr/>
+          </p:nvSpPr>
+          <p:spPr>
+            <a:xfrm>
+              <a:off x="1738904" y="1953191"/>
+              <a:ext cx="133350" cy="215444"/>
+            </a:xfrm>
+            <a:prstGeom prst="rect">
+              <a:avLst/>
+            </a:prstGeom>
+            <a:noFill/>
+          </p:spPr>
+          <p:txBody>
+            <a:bodyPr wrap="square" rtlCol="0">
+              <a:spAutoFit/>
+            </a:bodyPr>
+            <a:lstStyle/>
+            <a:p>
+              <a:r>
+                <a:rPr lang="en-GB" sz="800" dirty="0" smtClean="0">
+                  <a:latin typeface="Times New Roman"/>
+                  <a:cs typeface="Times New Roman"/>
+                </a:rPr>
+                <a:t>0</a:t>
+              </a:r>
+              <a:endParaRPr lang="en-GB" sz="800" dirty="0">
+                <a:latin typeface="Times New Roman"/>
+                <a:cs typeface="Times New Roman"/>
+              </a:endParaRPr>
+            </a:p>
+          </p:txBody>
+        </p:sp>
+        <p:sp>
+          <p:nvSpPr>
+            <p:cNvPr id="33" name="TextBox 32"/>
+            <p:cNvSpPr txBox="1"/>
+            <p:nvPr/>
+          </p:nvSpPr>
+          <p:spPr>
+            <a:xfrm>
+              <a:off x="1315675" y="2261991"/>
+              <a:ext cx="133350" cy="215444"/>
+            </a:xfrm>
+            <a:prstGeom prst="rect">
+              <a:avLst/>
+            </a:prstGeom>
+            <a:noFill/>
+          </p:spPr>
+          <p:txBody>
+            <a:bodyPr wrap="square" rtlCol="0">
+              <a:spAutoFit/>
+            </a:bodyPr>
+            <a:lstStyle/>
+            <a:p>
+              <a:r>
+                <a:rPr lang="en-GB" sz="800" dirty="0" smtClean="0">
+                  <a:latin typeface="Times New Roman"/>
+                  <a:cs typeface="Times New Roman"/>
+                </a:rPr>
+                <a:t>0</a:t>
+              </a:r>
+              <a:endParaRPr lang="en-GB" sz="800" dirty="0">
+                <a:latin typeface="Times New Roman"/>
+                <a:cs typeface="Times New Roman"/>
+              </a:endParaRPr>
+            </a:p>
+          </p:txBody>
+        </p:sp>
+        <p:sp>
+          <p:nvSpPr>
+            <p:cNvPr id="34" name="TextBox 33"/>
+            <p:cNvSpPr txBox="1"/>
+            <p:nvPr/>
+          </p:nvSpPr>
+          <p:spPr>
+            <a:xfrm>
+              <a:off x="1836499" y="1953191"/>
+              <a:ext cx="384114" cy="215444"/>
+            </a:xfrm>
+            <a:prstGeom prst="rect">
+              <a:avLst/>
+            </a:prstGeom>
+            <a:noFill/>
+          </p:spPr>
+          <p:txBody>
+            <a:bodyPr wrap="square" rtlCol="0">
+              <a:spAutoFit/>
+            </a:bodyPr>
+            <a:lstStyle/>
+            <a:p>
+              <a:r>
+                <a:rPr lang="en-GB" sz="800" dirty="0" smtClean="0">
+                  <a:latin typeface="Times New Roman"/>
+                  <a:cs typeface="Times New Roman"/>
+                </a:rPr>
+                <a:t>12.5</a:t>
+              </a:r>
+              <a:endParaRPr lang="en-GB" sz="800" dirty="0">
+                <a:latin typeface="Times New Roman"/>
+                <a:cs typeface="Times New Roman"/>
+              </a:endParaRPr>
+            </a:p>
+          </p:txBody>
+        </p:sp>
+        <p:sp>
+          <p:nvSpPr>
+            <p:cNvPr id="35" name="TextBox 34"/>
+            <p:cNvSpPr txBox="1"/>
+            <p:nvPr/>
+          </p:nvSpPr>
+          <p:spPr>
+            <a:xfrm>
+              <a:off x="1220486" y="2392384"/>
+              <a:ext cx="384114" cy="215444"/>
+            </a:xfrm>
+            <a:prstGeom prst="rect">
+              <a:avLst/>
+            </a:prstGeom>
+            <a:noFill/>
+          </p:spPr>
+          <p:txBody>
+            <a:bodyPr wrap="square" rtlCol="0">
+              <a:spAutoFit/>
+            </a:bodyPr>
+            <a:lstStyle/>
+            <a:p>
+              <a:r>
+                <a:rPr lang="en-GB" sz="800" dirty="0" smtClean="0">
+                  <a:latin typeface="Times New Roman"/>
+                  <a:cs typeface="Times New Roman"/>
+                </a:rPr>
+                <a:t>12.5</a:t>
+              </a:r>
+              <a:endParaRPr lang="en-GB" sz="800" dirty="0">
+                <a:latin typeface="Times New Roman"/>
+                <a:cs typeface="Times New Roman"/>
+              </a:endParaRPr>
+            </a:p>
+          </p:txBody>
+        </p:sp>
+        <p:sp>
+          <p:nvSpPr>
+            <p:cNvPr id="36" name="TextBox 35"/>
+            <p:cNvSpPr txBox="1"/>
+            <p:nvPr/>
+          </p:nvSpPr>
+          <p:spPr>
+            <a:xfrm>
+              <a:off x="3196229" y="1953191"/>
+              <a:ext cx="384114" cy="215444"/>
+            </a:xfrm>
+            <a:prstGeom prst="rect">
+              <a:avLst/>
+            </a:prstGeom>
+            <a:noFill/>
+          </p:spPr>
+          <p:txBody>
+            <a:bodyPr wrap="square" rtlCol="0">
+              <a:spAutoFit/>
+            </a:bodyPr>
+            <a:lstStyle/>
+            <a:p>
+              <a:r>
+                <a:rPr lang="en-GB" sz="800" dirty="0" smtClean="0">
+                  <a:latin typeface="Times New Roman"/>
+                  <a:cs typeface="Times New Roman"/>
+                </a:rPr>
+                <a:t>1000</a:t>
+              </a:r>
+              <a:endParaRPr lang="en-GB" sz="800" dirty="0">
+                <a:latin typeface="Times New Roman"/>
+                <a:cs typeface="Times New Roman"/>
+              </a:endParaRPr>
+            </a:p>
+          </p:txBody>
+        </p:sp>
+        <p:sp>
+          <p:nvSpPr>
+            <p:cNvPr id="37" name="TextBox 36"/>
+            <p:cNvSpPr txBox="1"/>
+            <p:nvPr/>
+          </p:nvSpPr>
+          <p:spPr>
+            <a:xfrm>
+              <a:off x="1242711" y="2846409"/>
+              <a:ext cx="384114" cy="215444"/>
+            </a:xfrm>
+            <a:prstGeom prst="rect">
+              <a:avLst/>
+            </a:prstGeom>
+            <a:noFill/>
+          </p:spPr>
+          <p:txBody>
+            <a:bodyPr wrap="square" rtlCol="0">
+              <a:spAutoFit/>
+            </a:bodyPr>
+            <a:lstStyle/>
+            <a:p>
+              <a:r>
+                <a:rPr lang="en-GB" sz="800" dirty="0" smtClean="0">
+                  <a:latin typeface="Times New Roman"/>
+                  <a:cs typeface="Times New Roman"/>
+                </a:rPr>
+                <a:t>250</a:t>
+              </a:r>
+              <a:endParaRPr lang="en-GB" sz="800" dirty="0">
+                <a:latin typeface="Times New Roman"/>
+                <a:cs typeface="Times New Roman"/>
+              </a:endParaRPr>
+            </a:p>
+          </p:txBody>
+        </p:sp>
+        <p:sp>
+          <p:nvSpPr>
+            <p:cNvPr id="38" name="TextBox 37"/>
+            <p:cNvSpPr txBox="1"/>
+            <p:nvPr/>
+          </p:nvSpPr>
+          <p:spPr>
+            <a:xfrm>
+              <a:off x="2148477" y="1775391"/>
+              <a:ext cx="1060389" cy="215444"/>
+            </a:xfrm>
+            <a:prstGeom prst="rect">
+              <a:avLst/>
+            </a:prstGeom>
+            <a:noFill/>
+          </p:spPr>
+          <p:txBody>
+            <a:bodyPr wrap="square" rtlCol="0">
+              <a:spAutoFit/>
+            </a:bodyPr>
+            <a:lstStyle/>
+            <a:p>
+              <a:r>
+                <a:rPr lang="en-GB" sz="800" dirty="0" smtClean="0">
+                  <a:latin typeface="Times New Roman"/>
+                  <a:cs typeface="Times New Roman"/>
+                </a:rPr>
+                <a:t>Inline position (m)</a:t>
+              </a:r>
+              <a:endParaRPr lang="en-GB" sz="800" dirty="0">
+                <a:latin typeface="Times New Roman"/>
+                <a:cs typeface="Times New Roman"/>
+              </a:endParaRPr>
+            </a:p>
+          </p:txBody>
+        </p:sp>
+        <p:sp>
+          <p:nvSpPr>
+            <p:cNvPr id="39" name="TextBox 38"/>
+            <p:cNvSpPr txBox="1"/>
+            <p:nvPr/>
+          </p:nvSpPr>
+          <p:spPr>
+            <a:xfrm rot="16200000">
+              <a:off x="651497" y="2539687"/>
+              <a:ext cx="1101664" cy="215444"/>
+            </a:xfrm>
+            <a:prstGeom prst="rect">
+              <a:avLst/>
+            </a:prstGeom>
+            <a:noFill/>
+          </p:spPr>
+          <p:txBody>
+            <a:bodyPr wrap="square" rtlCol="0">
+              <a:spAutoFit/>
+            </a:bodyPr>
+            <a:lstStyle/>
+            <a:p>
+              <a:r>
+                <a:rPr lang="en-GB" sz="800" dirty="0" smtClean="0">
+                  <a:latin typeface="Times New Roman"/>
+                  <a:cs typeface="Times New Roman"/>
+                </a:rPr>
+                <a:t>Crossline position (m)</a:t>
+              </a:r>
+              <a:endParaRPr lang="en-GB" sz="800" dirty="0">
+                <a:latin typeface="Times New Roman"/>
+                <a:cs typeface="Times New Roman"/>
+              </a:endParaRPr>
+            </a:p>
+          </p:txBody>
+        </p:sp>
+        <p:sp>
+          <p:nvSpPr>
+            <p:cNvPr id="103" name="TextBox 102"/>
+            <p:cNvSpPr txBox="1"/>
+            <p:nvPr/>
+          </p:nvSpPr>
+          <p:spPr>
+            <a:xfrm rot="5400000">
+              <a:off x="1743967" y="2445643"/>
+              <a:ext cx="336550" cy="369332"/>
+            </a:xfrm>
+            <a:prstGeom prst="rect">
+              <a:avLst/>
+            </a:prstGeom>
+            <a:noFill/>
+          </p:spPr>
+          <p:txBody>
+            <a:bodyPr wrap="square" rtlCol="0">
+              <a:spAutoFit/>
+            </a:bodyPr>
+            <a:lstStyle/>
+            <a:p>
+              <a:r>
+                <a:rPr lang="en-GB" dirty="0" smtClean="0"/>
+                <a:t>…</a:t>
+              </a:r>
+              <a:endParaRPr lang="en-GB" dirty="0"/>
+            </a:p>
+          </p:txBody>
+        </p:sp>
+        <p:sp>
+          <p:nvSpPr>
+            <p:cNvPr id="104" name="TextBox 103"/>
+            <p:cNvSpPr txBox="1"/>
+            <p:nvPr/>
+          </p:nvSpPr>
+          <p:spPr>
+            <a:xfrm rot="5400000">
+              <a:off x="3300629" y="2445643"/>
+              <a:ext cx="336550" cy="369332"/>
+            </a:xfrm>
+            <a:prstGeom prst="rect">
+              <a:avLst/>
+            </a:prstGeom>
+            <a:noFill/>
+          </p:spPr>
+          <p:txBody>
+            <a:bodyPr wrap="square" rtlCol="0">
+              <a:spAutoFit/>
+            </a:bodyPr>
+            <a:lstStyle/>
+            <a:p>
+              <a:r>
+                <a:rPr lang="en-GB" dirty="0" smtClean="0"/>
+                <a:t>…</a:t>
+              </a:r>
+              <a:endParaRPr lang="en-GB" dirty="0"/>
+            </a:p>
+          </p:txBody>
+        </p:sp>
+      </p:grpSp>
+    </p:spTree>
+    <p:extLst>
+      <p:ext uri="{BB962C8B-B14F-4D97-AF65-F5344CB8AC3E}">
+        <p14:creationId xmlns:p14="http://schemas.microsoft.com/office/powerpoint/2010/main" val="1206732641"/>
+      </p:ext>
+    </p:extLst>
+  </p:cSld>
+  <p:clrMapOvr>
+    <a:masterClrMapping/>
+  </p:clrMapOvr>
+</p:sld>
+</file>
+
+<file path=ppt/slides/slide11.xml><?xml version="1.0" encoding="utf-8"?>
+<p:sld xmlns:a="http://schemas.openxmlformats.org/drawingml/2006/main" xmlns:r="http://schemas.openxmlformats.org/officeDocument/2006/relationships" xmlns:p="http://schemas.openxmlformats.org/presentationml/2006/main">
+  <p:cSld>
+    <p:spTree>
+      <p:nvGrpSpPr>
+        <p:cNvPr id="1" name=""/>
+        <p:cNvGrpSpPr/>
+        <p:nvPr/>
+      </p:nvGrpSpPr>
+      <p:grpSpPr>
+        <a:xfrm>
+          <a:off x="0" y="0"/>
+          <a:ext cx="0" cy="0"/>
+          <a:chOff x="0" y="0"/>
+          <a:chExt cx="0" cy="0"/>
+        </a:xfrm>
+      </p:grpSpPr>
+      <p:grpSp>
+        <p:nvGrpSpPr>
+          <p:cNvPr id="15" name="Group 14"/>
+          <p:cNvGrpSpPr/>
+          <p:nvPr/>
+        </p:nvGrpSpPr>
+        <p:grpSpPr>
+          <a:xfrm>
+            <a:off x="-15840" y="3756010"/>
+            <a:ext cx="1767417" cy="2256600"/>
+            <a:chOff x="552876" y="554651"/>
+            <a:chExt cx="1767417" cy="2256600"/>
+          </a:xfrm>
+        </p:grpSpPr>
+        <p:sp>
+          <p:nvSpPr>
+            <p:cNvPr id="42" name="Rectangle 41"/>
+            <p:cNvSpPr/>
+            <p:nvPr/>
+          </p:nvSpPr>
+          <p:spPr>
+            <a:xfrm>
+              <a:off x="987850" y="1722733"/>
+              <a:ext cx="897468" cy="605600"/>
+            </a:xfrm>
+            <a:prstGeom prst="rect">
+              <a:avLst/>
+            </a:prstGeom>
+            <a:solidFill>
+              <a:schemeClr val="bg1">
+                <a:lumMod val="50000"/>
+              </a:schemeClr>
+            </a:solidFill>
+            <a:ln>
+              <a:noFill/>
+            </a:ln>
+            <a:effectLst/>
+          </p:spPr>
+          <p:style>
+            <a:lnRef idx="1">
+              <a:schemeClr val="accent1"/>
+            </a:lnRef>
+            <a:fillRef idx="3">
+              <a:schemeClr val="accent1"/>
+            </a:fillRef>
+            <a:effectRef idx="2">
+              <a:schemeClr val="accent1"/>
+            </a:effectRef>
+            <a:fontRef idx="minor">
+              <a:schemeClr val="lt1"/>
+            </a:fontRef>
+          </p:style>
+          <p:txBody>
+            <a:bodyPr rtlCol="0" anchor="ctr"/>
+            <a:lstStyle/>
+            <a:p>
+              <a:pPr algn="ctr"/>
+              <a:endParaRPr lang="en-GB"/>
+            </a:p>
+          </p:txBody>
+        </p:sp>
+        <p:grpSp>
+          <p:nvGrpSpPr>
+            <p:cNvPr id="40" name="Group 39"/>
+            <p:cNvGrpSpPr/>
+            <p:nvPr/>
+          </p:nvGrpSpPr>
+          <p:grpSpPr>
+            <a:xfrm>
+              <a:off x="552876" y="1494785"/>
+              <a:ext cx="1767417" cy="1316466"/>
+              <a:chOff x="552876" y="1494785"/>
+              <a:chExt cx="1767417" cy="1316466"/>
+            </a:xfrm>
+          </p:grpSpPr>
+          <p:grpSp>
+            <p:nvGrpSpPr>
+              <p:cNvPr id="38" name="Group 37"/>
+              <p:cNvGrpSpPr/>
+              <p:nvPr/>
+            </p:nvGrpSpPr>
+            <p:grpSpPr>
+              <a:xfrm>
+                <a:off x="1206433" y="1494785"/>
+                <a:ext cx="460302" cy="135866"/>
+                <a:chOff x="1169097" y="1494785"/>
+                <a:chExt cx="460302" cy="135866"/>
+              </a:xfrm>
+            </p:grpSpPr>
+            <p:sp>
+              <p:nvSpPr>
+                <p:cNvPr id="4" name="Explosion 1 3"/>
+                <p:cNvSpPr/>
+                <p:nvPr/>
+              </p:nvSpPr>
+              <p:spPr>
+                <a:xfrm>
+                  <a:off x="1169097" y="1494785"/>
+                  <a:ext cx="135861" cy="135866"/>
+                </a:xfrm>
+                <a:prstGeom prst="irregularSeal1">
+                  <a:avLst/>
+                </a:prstGeom>
+                <a:solidFill>
+                  <a:schemeClr val="tx1">
+                    <a:lumMod val="75000"/>
+                    <a:lumOff val="25000"/>
+                  </a:schemeClr>
+                </a:solidFill>
+                <a:ln>
+                  <a:noFill/>
+                </a:ln>
+                <a:effectLst/>
+              </p:spPr>
+              <p:style>
+                <a:lnRef idx="1">
+                  <a:schemeClr val="accent1"/>
+                </a:lnRef>
+                <a:fillRef idx="3">
+                  <a:schemeClr val="accent1"/>
+                </a:fillRef>
+                <a:effectRef idx="2">
+                  <a:schemeClr val="accent1"/>
+                </a:effectRef>
+                <a:fontRef idx="minor">
+                  <a:schemeClr val="lt1"/>
+                </a:fontRef>
+              </p:style>
+              <p:txBody>
+                <a:bodyPr rtlCol="0" anchor="ctr"/>
+                <a:lstStyle/>
+                <a:p>
+                  <a:pPr algn="ctr"/>
+                  <a:endParaRPr lang="en-GB"/>
+                </a:p>
+              </p:txBody>
+            </p:sp>
+            <p:sp>
+              <p:nvSpPr>
+                <p:cNvPr id="5" name="Explosion 1 4"/>
+                <p:cNvSpPr/>
+                <p:nvPr/>
+              </p:nvSpPr>
+              <p:spPr>
+                <a:xfrm>
+                  <a:off x="1493538" y="1494785"/>
+                  <a:ext cx="135861" cy="135866"/>
+                </a:xfrm>
+                <a:prstGeom prst="irregularSeal1">
+                  <a:avLst/>
+                </a:prstGeom>
+                <a:solidFill>
+                  <a:schemeClr val="tx1">
+                    <a:lumMod val="75000"/>
+                    <a:lumOff val="25000"/>
+                  </a:schemeClr>
+                </a:solidFill>
+                <a:ln>
+                  <a:noFill/>
+                </a:ln>
+                <a:effectLst/>
+              </p:spPr>
+              <p:style>
+                <a:lnRef idx="1">
+                  <a:schemeClr val="accent1"/>
+                </a:lnRef>
+                <a:fillRef idx="3">
+                  <a:schemeClr val="accent1"/>
+                </a:fillRef>
+                <a:effectRef idx="2">
+                  <a:schemeClr val="accent1"/>
+                </a:effectRef>
+                <a:fontRef idx="minor">
+                  <a:schemeClr val="lt1"/>
+                </a:fontRef>
+              </p:style>
+              <p:txBody>
+                <a:bodyPr rtlCol="0" anchor="ctr"/>
+                <a:lstStyle/>
+                <a:p>
+                  <a:pPr algn="ctr"/>
+                  <a:endParaRPr lang="en-GB"/>
+                </a:p>
+              </p:txBody>
+            </p:sp>
+          </p:grpSp>
+          <p:grpSp>
+            <p:nvGrpSpPr>
+              <p:cNvPr id="37" name="Group 36"/>
+              <p:cNvGrpSpPr/>
+              <p:nvPr/>
+            </p:nvGrpSpPr>
+            <p:grpSpPr>
+              <a:xfrm>
+                <a:off x="552876" y="1845395"/>
+                <a:ext cx="1767417" cy="965856"/>
+                <a:chOff x="552876" y="1845395"/>
+                <a:chExt cx="1767417" cy="965856"/>
+              </a:xfrm>
+            </p:grpSpPr>
+            <p:grpSp>
+              <p:nvGrpSpPr>
+                <p:cNvPr id="18" name="Group 17"/>
+                <p:cNvGrpSpPr/>
+                <p:nvPr/>
+              </p:nvGrpSpPr>
+              <p:grpSpPr>
+                <a:xfrm>
+                  <a:off x="552876" y="1845395"/>
+                  <a:ext cx="133351" cy="965856"/>
+                  <a:chOff x="1746676" y="2059586"/>
+                  <a:chExt cx="133351" cy="965856"/>
+                </a:xfrm>
+              </p:grpSpPr>
+              <p:sp>
+                <p:nvSpPr>
+                  <p:cNvPr id="10" name="Isosceles Triangle 9"/>
+                  <p:cNvSpPr/>
+                  <p:nvPr/>
+                </p:nvSpPr>
+                <p:spPr>
+                  <a:xfrm rot="10800000">
+                    <a:off x="1746677" y="2059586"/>
+                    <a:ext cx="133350" cy="114957"/>
+                  </a:xfrm>
+                  <a:prstGeom prst="triangle">
+                    <a:avLst/>
+                  </a:prstGeom>
+                  <a:solidFill>
+                    <a:srgbClr val="0000FF"/>
+                  </a:solidFill>
+                  <a:ln>
+                    <a:solidFill>
+                      <a:schemeClr val="tx1"/>
+                    </a:solidFill>
+                  </a:ln>
+                  <a:effectLst/>
+                </p:spPr>
+                <p:style>
+                  <a:lnRef idx="1">
+                    <a:schemeClr val="accent1"/>
+                  </a:lnRef>
+                  <a:fillRef idx="3">
+                    <a:schemeClr val="accent1"/>
+                  </a:fillRef>
+                  <a:effectRef idx="2">
+                    <a:schemeClr val="accent1"/>
+                  </a:effectRef>
+                  <a:fontRef idx="minor">
+                    <a:schemeClr val="lt1"/>
+                  </a:fontRef>
+                </p:style>
+                <p:txBody>
+                  <a:bodyPr rtlCol="0" anchor="ctr"/>
+                  <a:lstStyle/>
+                  <a:p>
+                    <a:pPr algn="ctr"/>
+                    <a:endParaRPr lang="en-GB"/>
+                  </a:p>
+                </p:txBody>
+              </p:sp>
+              <p:sp>
+                <p:nvSpPr>
+                  <p:cNvPr id="11" name="Isosceles Triangle 10"/>
+                  <p:cNvSpPr/>
+                  <p:nvPr/>
+                </p:nvSpPr>
+                <p:spPr>
+                  <a:xfrm rot="10800000">
+                    <a:off x="1746677" y="2343219"/>
+                    <a:ext cx="133350" cy="114957"/>
+                  </a:xfrm>
+                  <a:prstGeom prst="triangle">
+                    <a:avLst/>
+                  </a:prstGeom>
+                  <a:solidFill>
+                    <a:srgbClr val="0000FF"/>
+                  </a:solidFill>
+                  <a:ln>
+                    <a:solidFill>
+                      <a:schemeClr val="tx1"/>
+                    </a:solidFill>
+                  </a:ln>
+                  <a:effectLst/>
+                </p:spPr>
+                <p:style>
+                  <a:lnRef idx="1">
+                    <a:schemeClr val="accent1"/>
+                  </a:lnRef>
+                  <a:fillRef idx="3">
+                    <a:schemeClr val="accent1"/>
+                  </a:fillRef>
+                  <a:effectRef idx="2">
+                    <a:schemeClr val="accent1"/>
+                  </a:effectRef>
+                  <a:fontRef idx="minor">
+                    <a:schemeClr val="lt1"/>
+                  </a:fontRef>
+                </p:style>
+                <p:txBody>
+                  <a:bodyPr rtlCol="0" anchor="ctr"/>
+                  <a:lstStyle/>
+                  <a:p>
+                    <a:pPr algn="ctr"/>
+                    <a:endParaRPr lang="en-GB"/>
+                  </a:p>
+                </p:txBody>
+              </p:sp>
+              <p:sp>
+                <p:nvSpPr>
+                  <p:cNvPr id="12" name="Isosceles Triangle 11"/>
+                  <p:cNvSpPr/>
+                  <p:nvPr/>
+                </p:nvSpPr>
+                <p:spPr>
+                  <a:xfrm rot="10800000">
+                    <a:off x="1746677" y="2626852"/>
+                    <a:ext cx="133350" cy="114957"/>
+                  </a:xfrm>
+                  <a:prstGeom prst="triangle">
+                    <a:avLst/>
+                  </a:prstGeom>
+                  <a:solidFill>
+                    <a:srgbClr val="0000FF"/>
+                  </a:solidFill>
+                  <a:ln>
+                    <a:solidFill>
+                      <a:schemeClr val="tx1"/>
+                    </a:solidFill>
+                  </a:ln>
+                  <a:effectLst/>
+                </p:spPr>
+                <p:style>
+                  <a:lnRef idx="1">
+                    <a:schemeClr val="accent1"/>
+                  </a:lnRef>
+                  <a:fillRef idx="3">
+                    <a:schemeClr val="accent1"/>
+                  </a:fillRef>
+                  <a:effectRef idx="2">
+                    <a:schemeClr val="accent1"/>
+                  </a:effectRef>
+                  <a:fontRef idx="minor">
+                    <a:schemeClr val="lt1"/>
+                  </a:fontRef>
+                </p:style>
+                <p:txBody>
+                  <a:bodyPr rtlCol="0" anchor="ctr"/>
+                  <a:lstStyle/>
+                  <a:p>
+                    <a:pPr algn="ctr"/>
+                    <a:endParaRPr lang="en-GB"/>
+                  </a:p>
+                </p:txBody>
+              </p:sp>
+              <p:sp>
+                <p:nvSpPr>
+                  <p:cNvPr id="13" name="Isosceles Triangle 12"/>
+                  <p:cNvSpPr/>
+                  <p:nvPr/>
+                </p:nvSpPr>
+                <p:spPr>
+                  <a:xfrm rot="10800000">
+                    <a:off x="1746676" y="2910485"/>
+                    <a:ext cx="133350" cy="114957"/>
+                  </a:xfrm>
+                  <a:prstGeom prst="triangle">
+                    <a:avLst/>
+                  </a:prstGeom>
+                  <a:solidFill>
+                    <a:srgbClr val="0000FF"/>
+                  </a:solidFill>
+                  <a:ln>
+                    <a:solidFill>
+                      <a:schemeClr val="tx1"/>
+                    </a:solidFill>
+                  </a:ln>
+                  <a:effectLst/>
+                </p:spPr>
+                <p:style>
+                  <a:lnRef idx="1">
+                    <a:schemeClr val="accent1"/>
+                  </a:lnRef>
+                  <a:fillRef idx="3">
+                    <a:schemeClr val="accent1"/>
+                  </a:fillRef>
+                  <a:effectRef idx="2">
+                    <a:schemeClr val="accent1"/>
+                  </a:effectRef>
+                  <a:fontRef idx="minor">
+                    <a:schemeClr val="lt1"/>
+                  </a:fontRef>
+                </p:style>
+                <p:txBody>
+                  <a:bodyPr rtlCol="0" anchor="ctr"/>
+                  <a:lstStyle/>
+                  <a:p>
+                    <a:pPr algn="ctr"/>
+                    <a:endParaRPr lang="en-GB"/>
+                  </a:p>
+                </p:txBody>
+              </p:sp>
+            </p:grpSp>
+            <p:grpSp>
+              <p:nvGrpSpPr>
+                <p:cNvPr id="19" name="Group 18"/>
+                <p:cNvGrpSpPr/>
+                <p:nvPr/>
+              </p:nvGrpSpPr>
+              <p:grpSpPr>
+                <a:xfrm>
+                  <a:off x="1097565" y="1845395"/>
+                  <a:ext cx="133351" cy="965856"/>
+                  <a:chOff x="1746676" y="2059586"/>
+                  <a:chExt cx="133351" cy="965856"/>
+                </a:xfrm>
+              </p:grpSpPr>
+              <p:sp>
+                <p:nvSpPr>
+                  <p:cNvPr id="20" name="Isosceles Triangle 19"/>
+                  <p:cNvSpPr/>
+                  <p:nvPr/>
+                </p:nvSpPr>
+                <p:spPr>
+                  <a:xfrm rot="10800000">
+                    <a:off x="1746677" y="2059586"/>
+                    <a:ext cx="133350" cy="114957"/>
+                  </a:xfrm>
+                  <a:prstGeom prst="triangle">
+                    <a:avLst/>
+                  </a:prstGeom>
+                  <a:solidFill>
+                    <a:srgbClr val="0000FF"/>
+                  </a:solidFill>
+                  <a:ln>
+                    <a:solidFill>
+                      <a:schemeClr val="tx1"/>
+                    </a:solidFill>
+                  </a:ln>
+                  <a:effectLst/>
+                </p:spPr>
+                <p:style>
+                  <a:lnRef idx="1">
+                    <a:schemeClr val="accent1"/>
+                  </a:lnRef>
+                  <a:fillRef idx="3">
+                    <a:schemeClr val="accent1"/>
+                  </a:fillRef>
+                  <a:effectRef idx="2">
+                    <a:schemeClr val="accent1"/>
+                  </a:effectRef>
+                  <a:fontRef idx="minor">
+                    <a:schemeClr val="lt1"/>
+                  </a:fontRef>
+                </p:style>
+                <p:txBody>
+                  <a:bodyPr rtlCol="0" anchor="ctr"/>
+                  <a:lstStyle/>
+                  <a:p>
+                    <a:pPr algn="ctr"/>
+                    <a:endParaRPr lang="en-GB"/>
+                  </a:p>
+                </p:txBody>
+              </p:sp>
+              <p:sp>
+                <p:nvSpPr>
+                  <p:cNvPr id="21" name="Isosceles Triangle 20"/>
+                  <p:cNvSpPr/>
+                  <p:nvPr/>
+                </p:nvSpPr>
+                <p:spPr>
+                  <a:xfrm rot="10800000">
+                    <a:off x="1746677" y="2343219"/>
+                    <a:ext cx="133350" cy="114957"/>
+                  </a:xfrm>
+                  <a:prstGeom prst="triangle">
+                    <a:avLst/>
+                  </a:prstGeom>
+                  <a:solidFill>
+                    <a:srgbClr val="0000FF"/>
+                  </a:solidFill>
+                  <a:ln>
+                    <a:solidFill>
+                      <a:schemeClr val="tx1"/>
+                    </a:solidFill>
+                  </a:ln>
+                  <a:effectLst/>
+                </p:spPr>
+                <p:style>
+                  <a:lnRef idx="1">
+                    <a:schemeClr val="accent1"/>
+                  </a:lnRef>
+                  <a:fillRef idx="3">
+                    <a:schemeClr val="accent1"/>
+                  </a:fillRef>
+                  <a:effectRef idx="2">
+                    <a:schemeClr val="accent1"/>
+                  </a:effectRef>
+                  <a:fontRef idx="minor">
+                    <a:schemeClr val="lt1"/>
+                  </a:fontRef>
+                </p:style>
+                <p:txBody>
+                  <a:bodyPr rtlCol="0" anchor="ctr"/>
+                  <a:lstStyle/>
+                  <a:p>
+                    <a:pPr algn="ctr"/>
+                    <a:endParaRPr lang="en-GB"/>
+                  </a:p>
+                </p:txBody>
+              </p:sp>
+              <p:sp>
+                <p:nvSpPr>
+                  <p:cNvPr id="22" name="Isosceles Triangle 21"/>
+                  <p:cNvSpPr/>
+                  <p:nvPr/>
+                </p:nvSpPr>
+                <p:spPr>
+                  <a:xfrm rot="10800000">
+                    <a:off x="1746677" y="2626852"/>
+                    <a:ext cx="133350" cy="114957"/>
+                  </a:xfrm>
+                  <a:prstGeom prst="triangle">
+                    <a:avLst/>
+                  </a:prstGeom>
+                  <a:solidFill>
+                    <a:srgbClr val="0000FF"/>
+                  </a:solidFill>
+                  <a:ln>
+                    <a:solidFill>
+                      <a:schemeClr val="tx1"/>
+                    </a:solidFill>
+                  </a:ln>
+                  <a:effectLst/>
+                </p:spPr>
+                <p:style>
+                  <a:lnRef idx="1">
+                    <a:schemeClr val="accent1"/>
+                  </a:lnRef>
+                  <a:fillRef idx="3">
+                    <a:schemeClr val="accent1"/>
+                  </a:fillRef>
+                  <a:effectRef idx="2">
+                    <a:schemeClr val="accent1"/>
+                  </a:effectRef>
+                  <a:fontRef idx="minor">
+                    <a:schemeClr val="lt1"/>
+                  </a:fontRef>
+                </p:style>
+                <p:txBody>
+                  <a:bodyPr rtlCol="0" anchor="ctr"/>
+                  <a:lstStyle/>
+                  <a:p>
+                    <a:pPr algn="ctr"/>
+                    <a:endParaRPr lang="en-GB"/>
+                  </a:p>
+                </p:txBody>
+              </p:sp>
+              <p:sp>
+                <p:nvSpPr>
+                  <p:cNvPr id="23" name="Isosceles Triangle 22"/>
+                  <p:cNvSpPr/>
+                  <p:nvPr/>
+                </p:nvSpPr>
+                <p:spPr>
+                  <a:xfrm rot="10800000">
+                    <a:off x="1746676" y="2910485"/>
+                    <a:ext cx="133350" cy="114957"/>
+                  </a:xfrm>
+                  <a:prstGeom prst="triangle">
+                    <a:avLst/>
+                  </a:prstGeom>
+                  <a:solidFill>
+                    <a:srgbClr val="0000FF"/>
+                  </a:solidFill>
+                  <a:ln>
+                    <a:solidFill>
+                      <a:schemeClr val="tx1"/>
+                    </a:solidFill>
+                  </a:ln>
+                  <a:effectLst/>
+                </p:spPr>
+                <p:style>
+                  <a:lnRef idx="1">
+                    <a:schemeClr val="accent1"/>
+                  </a:lnRef>
+                  <a:fillRef idx="3">
+                    <a:schemeClr val="accent1"/>
+                  </a:fillRef>
+                  <a:effectRef idx="2">
+                    <a:schemeClr val="accent1"/>
+                  </a:effectRef>
+                  <a:fontRef idx="minor">
+                    <a:schemeClr val="lt1"/>
+                  </a:fontRef>
+                </p:style>
+                <p:txBody>
+                  <a:bodyPr rtlCol="0" anchor="ctr"/>
+                  <a:lstStyle/>
+                  <a:p>
+                    <a:pPr algn="ctr"/>
+                    <a:endParaRPr lang="en-GB"/>
+                  </a:p>
+                </p:txBody>
+              </p:sp>
+            </p:grpSp>
+            <p:grpSp>
+              <p:nvGrpSpPr>
+                <p:cNvPr id="25" name="Group 24"/>
+                <p:cNvGrpSpPr/>
+                <p:nvPr/>
+              </p:nvGrpSpPr>
+              <p:grpSpPr>
+                <a:xfrm>
+                  <a:off x="1642254" y="1845395"/>
+                  <a:ext cx="133351" cy="965856"/>
+                  <a:chOff x="1746676" y="2059586"/>
+                  <a:chExt cx="133351" cy="965856"/>
+                </a:xfrm>
+              </p:grpSpPr>
+              <p:sp>
+                <p:nvSpPr>
+                  <p:cNvPr id="26" name="Isosceles Triangle 25"/>
+                  <p:cNvSpPr/>
+                  <p:nvPr/>
+                </p:nvSpPr>
+                <p:spPr>
+                  <a:xfrm rot="10800000">
+                    <a:off x="1746677" y="2059586"/>
+                    <a:ext cx="133350" cy="114957"/>
+                  </a:xfrm>
+                  <a:prstGeom prst="triangle">
+                    <a:avLst/>
+                  </a:prstGeom>
+                  <a:solidFill>
+                    <a:srgbClr val="0000FF"/>
+                  </a:solidFill>
+                  <a:ln>
+                    <a:solidFill>
+                      <a:schemeClr val="tx1"/>
+                    </a:solidFill>
+                  </a:ln>
+                  <a:effectLst/>
+                </p:spPr>
+                <p:style>
+                  <a:lnRef idx="1">
+                    <a:schemeClr val="accent1"/>
+                  </a:lnRef>
+                  <a:fillRef idx="3">
+                    <a:schemeClr val="accent1"/>
+                  </a:fillRef>
+                  <a:effectRef idx="2">
+                    <a:schemeClr val="accent1"/>
+                  </a:effectRef>
+                  <a:fontRef idx="minor">
+                    <a:schemeClr val="lt1"/>
+                  </a:fontRef>
+                </p:style>
+                <p:txBody>
+                  <a:bodyPr rtlCol="0" anchor="ctr"/>
+                  <a:lstStyle/>
+                  <a:p>
+                    <a:pPr algn="ctr"/>
+                    <a:endParaRPr lang="en-GB"/>
+                  </a:p>
+                </p:txBody>
+              </p:sp>
+              <p:sp>
+                <p:nvSpPr>
+                  <p:cNvPr id="27" name="Isosceles Triangle 26"/>
+                  <p:cNvSpPr/>
+                  <p:nvPr/>
+                </p:nvSpPr>
+                <p:spPr>
+                  <a:xfrm rot="10800000">
+                    <a:off x="1746677" y="2343219"/>
+                    <a:ext cx="133350" cy="114957"/>
+                  </a:xfrm>
+                  <a:prstGeom prst="triangle">
+                    <a:avLst/>
+                  </a:prstGeom>
+                  <a:solidFill>
+                    <a:srgbClr val="0000FF"/>
+                  </a:solidFill>
+                  <a:ln>
+                    <a:solidFill>
+                      <a:schemeClr val="tx1"/>
+                    </a:solidFill>
+                  </a:ln>
+                  <a:effectLst/>
+                </p:spPr>
+                <p:style>
+                  <a:lnRef idx="1">
+                    <a:schemeClr val="accent1"/>
+                  </a:lnRef>
+                  <a:fillRef idx="3">
+                    <a:schemeClr val="accent1"/>
+                  </a:fillRef>
+                  <a:effectRef idx="2">
+                    <a:schemeClr val="accent1"/>
+                  </a:effectRef>
+                  <a:fontRef idx="minor">
+                    <a:schemeClr val="lt1"/>
+                  </a:fontRef>
+                </p:style>
+                <p:txBody>
+                  <a:bodyPr rtlCol="0" anchor="ctr"/>
+                  <a:lstStyle/>
+                  <a:p>
+                    <a:pPr algn="ctr"/>
+                    <a:endParaRPr lang="en-GB"/>
+                  </a:p>
+                </p:txBody>
+              </p:sp>
+              <p:sp>
+                <p:nvSpPr>
+                  <p:cNvPr id="28" name="Isosceles Triangle 27"/>
+                  <p:cNvSpPr/>
+                  <p:nvPr/>
+                </p:nvSpPr>
+                <p:spPr>
+                  <a:xfrm rot="10800000">
+                    <a:off x="1746677" y="2626852"/>
+                    <a:ext cx="133350" cy="114957"/>
+                  </a:xfrm>
+                  <a:prstGeom prst="triangle">
+                    <a:avLst/>
+                  </a:prstGeom>
+                  <a:solidFill>
+                    <a:srgbClr val="0000FF"/>
+                  </a:solidFill>
+                  <a:ln>
+                    <a:solidFill>
+                      <a:schemeClr val="tx1"/>
+                    </a:solidFill>
+                  </a:ln>
+                  <a:effectLst/>
+                </p:spPr>
+                <p:style>
+                  <a:lnRef idx="1">
+                    <a:schemeClr val="accent1"/>
+                  </a:lnRef>
+                  <a:fillRef idx="3">
+                    <a:schemeClr val="accent1"/>
+                  </a:fillRef>
+                  <a:effectRef idx="2">
+                    <a:schemeClr val="accent1"/>
+                  </a:effectRef>
+                  <a:fontRef idx="minor">
+                    <a:schemeClr val="lt1"/>
+                  </a:fontRef>
+                </p:style>
+                <p:txBody>
+                  <a:bodyPr rtlCol="0" anchor="ctr"/>
+                  <a:lstStyle/>
+                  <a:p>
+                    <a:pPr algn="ctr"/>
+                    <a:endParaRPr lang="en-GB"/>
+                  </a:p>
+                </p:txBody>
+              </p:sp>
+              <p:sp>
+                <p:nvSpPr>
+                  <p:cNvPr id="29" name="Isosceles Triangle 28"/>
+                  <p:cNvSpPr/>
+                  <p:nvPr/>
+                </p:nvSpPr>
+                <p:spPr>
+                  <a:xfrm rot="10800000">
+                    <a:off x="1746676" y="2910485"/>
+                    <a:ext cx="133350" cy="114957"/>
+                  </a:xfrm>
+                  <a:prstGeom prst="triangle">
+                    <a:avLst/>
+                  </a:prstGeom>
+                  <a:solidFill>
+                    <a:srgbClr val="0000FF"/>
+                  </a:solidFill>
+                  <a:ln>
+                    <a:solidFill>
+                      <a:schemeClr val="tx1"/>
+                    </a:solidFill>
+                  </a:ln>
+                  <a:effectLst/>
+                </p:spPr>
+                <p:style>
+                  <a:lnRef idx="1">
+                    <a:schemeClr val="accent1"/>
+                  </a:lnRef>
+                  <a:fillRef idx="3">
+                    <a:schemeClr val="accent1"/>
+                  </a:fillRef>
+                  <a:effectRef idx="2">
+                    <a:schemeClr val="accent1"/>
+                  </a:effectRef>
+                  <a:fontRef idx="minor">
+                    <a:schemeClr val="lt1"/>
+                  </a:fontRef>
+                </p:style>
+                <p:txBody>
+                  <a:bodyPr rtlCol="0" anchor="ctr"/>
+                  <a:lstStyle/>
+                  <a:p>
+                    <a:pPr algn="ctr"/>
+                    <a:endParaRPr lang="en-GB"/>
+                  </a:p>
+                </p:txBody>
+              </p:sp>
+            </p:grpSp>
+            <p:grpSp>
+              <p:nvGrpSpPr>
+                <p:cNvPr id="31" name="Group 30"/>
+                <p:cNvGrpSpPr/>
+                <p:nvPr/>
+              </p:nvGrpSpPr>
+              <p:grpSpPr>
+                <a:xfrm>
+                  <a:off x="2186942" y="1845395"/>
+                  <a:ext cx="133351" cy="965856"/>
+                  <a:chOff x="1746676" y="2059586"/>
+                  <a:chExt cx="133351" cy="965856"/>
+                </a:xfrm>
+              </p:grpSpPr>
+              <p:sp>
+                <p:nvSpPr>
+                  <p:cNvPr id="32" name="Isosceles Triangle 31"/>
+                  <p:cNvSpPr/>
+                  <p:nvPr/>
+                </p:nvSpPr>
+                <p:spPr>
+                  <a:xfrm rot="10800000">
+                    <a:off x="1746677" y="2059586"/>
+                    <a:ext cx="133350" cy="114957"/>
+                  </a:xfrm>
+                  <a:prstGeom prst="triangle">
+                    <a:avLst/>
+                  </a:prstGeom>
+                  <a:solidFill>
+                    <a:srgbClr val="0000FF"/>
+                  </a:solidFill>
+                  <a:ln>
+                    <a:solidFill>
+                      <a:schemeClr val="tx1"/>
+                    </a:solidFill>
+                  </a:ln>
+                  <a:effectLst/>
+                </p:spPr>
+                <p:style>
+                  <a:lnRef idx="1">
+                    <a:schemeClr val="accent1"/>
+                  </a:lnRef>
+                  <a:fillRef idx="3">
+                    <a:schemeClr val="accent1"/>
+                  </a:fillRef>
+                  <a:effectRef idx="2">
+                    <a:schemeClr val="accent1"/>
+                  </a:effectRef>
+                  <a:fontRef idx="minor">
+                    <a:schemeClr val="lt1"/>
+                  </a:fontRef>
+                </p:style>
+                <p:txBody>
+                  <a:bodyPr rtlCol="0" anchor="ctr"/>
+                  <a:lstStyle/>
+                  <a:p>
+                    <a:pPr algn="ctr"/>
+                    <a:endParaRPr lang="en-GB"/>
+                  </a:p>
+                </p:txBody>
+              </p:sp>
+              <p:sp>
+                <p:nvSpPr>
+                  <p:cNvPr id="33" name="Isosceles Triangle 32"/>
+                  <p:cNvSpPr/>
+                  <p:nvPr/>
+                </p:nvSpPr>
+                <p:spPr>
+                  <a:xfrm rot="10800000">
+                    <a:off x="1746677" y="2343219"/>
+                    <a:ext cx="133350" cy="114957"/>
+                  </a:xfrm>
+                  <a:prstGeom prst="triangle">
+                    <a:avLst/>
+                  </a:prstGeom>
+                  <a:solidFill>
+                    <a:srgbClr val="0000FF"/>
+                  </a:solidFill>
+                  <a:ln>
+                    <a:solidFill>
+                      <a:schemeClr val="tx1"/>
+                    </a:solidFill>
+                  </a:ln>
+                  <a:effectLst/>
+                </p:spPr>
+                <p:style>
+                  <a:lnRef idx="1">
+                    <a:schemeClr val="accent1"/>
+                  </a:lnRef>
+                  <a:fillRef idx="3">
+                    <a:schemeClr val="accent1"/>
+                  </a:fillRef>
+                  <a:effectRef idx="2">
+                    <a:schemeClr val="accent1"/>
+                  </a:effectRef>
+                  <a:fontRef idx="minor">
+                    <a:schemeClr val="lt1"/>
+                  </a:fontRef>
+                </p:style>
+                <p:txBody>
+                  <a:bodyPr rtlCol="0" anchor="ctr"/>
+                  <a:lstStyle/>
+                  <a:p>
+                    <a:pPr algn="ctr"/>
+                    <a:endParaRPr lang="en-GB"/>
+                  </a:p>
+                </p:txBody>
+              </p:sp>
+              <p:sp>
+                <p:nvSpPr>
+                  <p:cNvPr id="34" name="Isosceles Triangle 33"/>
+                  <p:cNvSpPr/>
+                  <p:nvPr/>
+                </p:nvSpPr>
+                <p:spPr>
+                  <a:xfrm rot="10800000">
+                    <a:off x="1746677" y="2626852"/>
+                    <a:ext cx="133350" cy="114957"/>
+                  </a:xfrm>
+                  <a:prstGeom prst="triangle">
+                    <a:avLst/>
+                  </a:prstGeom>
+                  <a:solidFill>
+                    <a:srgbClr val="0000FF"/>
+                  </a:solidFill>
+                  <a:ln>
+                    <a:solidFill>
+                      <a:schemeClr val="tx1"/>
+                    </a:solidFill>
+                  </a:ln>
+                  <a:effectLst/>
+                </p:spPr>
+                <p:style>
+                  <a:lnRef idx="1">
+                    <a:schemeClr val="accent1"/>
+                  </a:lnRef>
+                  <a:fillRef idx="3">
+                    <a:schemeClr val="accent1"/>
+                  </a:fillRef>
+                  <a:effectRef idx="2">
+                    <a:schemeClr val="accent1"/>
+                  </a:effectRef>
+                  <a:fontRef idx="minor">
+                    <a:schemeClr val="lt1"/>
+                  </a:fontRef>
+                </p:style>
+                <p:txBody>
+                  <a:bodyPr rtlCol="0" anchor="ctr"/>
+                  <a:lstStyle/>
+                  <a:p>
+                    <a:pPr algn="ctr"/>
+                    <a:endParaRPr lang="en-GB"/>
+                  </a:p>
+                </p:txBody>
+              </p:sp>
+              <p:sp>
+                <p:nvSpPr>
+                  <p:cNvPr id="35" name="Isosceles Triangle 34"/>
+                  <p:cNvSpPr/>
+                  <p:nvPr/>
+                </p:nvSpPr>
+                <p:spPr>
+                  <a:xfrm rot="10800000">
+                    <a:off x="1746676" y="2910485"/>
+                    <a:ext cx="133350" cy="114957"/>
+                  </a:xfrm>
+                  <a:prstGeom prst="triangle">
+                    <a:avLst/>
+                  </a:prstGeom>
+                  <a:solidFill>
+                    <a:srgbClr val="0000FF"/>
+                  </a:solidFill>
+                  <a:ln>
+                    <a:solidFill>
+                      <a:schemeClr val="tx1"/>
+                    </a:solidFill>
+                  </a:ln>
+                  <a:effectLst/>
+                </p:spPr>
+                <p:style>
+                  <a:lnRef idx="1">
+                    <a:schemeClr val="accent1"/>
+                  </a:lnRef>
+                  <a:fillRef idx="3">
+                    <a:schemeClr val="accent1"/>
+                  </a:fillRef>
+                  <a:effectRef idx="2">
+                    <a:schemeClr val="accent1"/>
+                  </a:effectRef>
+                  <a:fontRef idx="minor">
+                    <a:schemeClr val="lt1"/>
+                  </a:fontRef>
+                </p:style>
+                <p:txBody>
+                  <a:bodyPr rtlCol="0" anchor="ctr"/>
+                  <a:lstStyle/>
+                  <a:p>
+                    <a:pPr algn="ctr"/>
+                    <a:endParaRPr lang="en-GB"/>
+                  </a:p>
+                </p:txBody>
+              </p:sp>
+            </p:grpSp>
+          </p:grpSp>
+        </p:grpSp>
+        <p:pic>
+          <p:nvPicPr>
+            <p:cNvPr id="41" name="Picture 40" descr="Boat-Top.png"/>
+            <p:cNvPicPr>
+              <a:picLocks noChangeAspect="1"/>
+            </p:cNvPicPr>
+            <p:nvPr/>
+          </p:nvPicPr>
+          <p:blipFill>
+            <a:blip r:embed="rId2">
+              <a:extLst>
+                <a:ext uri="{28A0092B-C50C-407E-A947-70E740481C1C}">
+                  <a14:useLocalDpi xmlns:a14="http://schemas.microsoft.com/office/drawing/2010/main" val="0"/>
+                </a:ext>
+              </a:extLst>
+            </a:blip>
+            <a:stretch>
+              <a:fillRect/>
+            </a:stretch>
+          </p:blipFill>
+          <p:spPr>
+            <a:xfrm>
+              <a:off x="1120393" y="554651"/>
+              <a:ext cx="632382" cy="1050205"/>
+            </a:xfrm>
+            <a:prstGeom prst="rect">
+              <a:avLst/>
+            </a:prstGeom>
+          </p:spPr>
+        </p:pic>
+      </p:grpSp>
+      <p:grpSp>
+        <p:nvGrpSpPr>
+          <p:cNvPr id="16" name="Group 15"/>
+          <p:cNvGrpSpPr/>
+          <p:nvPr/>
+        </p:nvGrpSpPr>
+        <p:grpSpPr>
+          <a:xfrm>
+            <a:off x="5740727" y="3756010"/>
+            <a:ext cx="1767417" cy="2256600"/>
+            <a:chOff x="4870876" y="707052"/>
+            <a:chExt cx="1767417" cy="2256600"/>
+          </a:xfrm>
+        </p:grpSpPr>
+        <p:pic>
+          <p:nvPicPr>
+            <p:cNvPr id="68" name="Picture 67" descr="Boat-Top.png"/>
+            <p:cNvPicPr>
+              <a:picLocks noChangeAspect="1"/>
+            </p:cNvPicPr>
+            <p:nvPr/>
+          </p:nvPicPr>
+          <p:blipFill>
+            <a:blip r:embed="rId2">
+              <a:extLst>
+                <a:ext uri="{28A0092B-C50C-407E-A947-70E740481C1C}">
+                  <a14:useLocalDpi xmlns:a14="http://schemas.microsoft.com/office/drawing/2010/main" val="0"/>
+                </a:ext>
+              </a:extLst>
+            </a:blip>
+            <a:stretch>
+              <a:fillRect/>
+            </a:stretch>
+          </p:blipFill>
+          <p:spPr>
+            <a:xfrm>
+              <a:off x="5438393" y="707052"/>
+              <a:ext cx="632382" cy="1050205"/>
+            </a:xfrm>
+            <a:prstGeom prst="rect">
+              <a:avLst/>
+            </a:prstGeom>
+          </p:spPr>
+        </p:pic>
+        <p:sp>
+          <p:nvSpPr>
+            <p:cNvPr id="6" name="Explosion 1 5"/>
+            <p:cNvSpPr/>
+            <p:nvPr/>
+          </p:nvSpPr>
+          <p:spPr>
+            <a:xfrm>
+              <a:off x="5632580" y="1650993"/>
+              <a:ext cx="135861" cy="135866"/>
+            </a:xfrm>
+            <a:prstGeom prst="irregularSeal1">
+              <a:avLst/>
+            </a:prstGeom>
+            <a:solidFill>
+              <a:schemeClr val="tx1">
+                <a:lumMod val="75000"/>
+                <a:lumOff val="25000"/>
+              </a:schemeClr>
+            </a:solidFill>
+            <a:ln>
+              <a:noFill/>
+            </a:ln>
+            <a:effectLst/>
+          </p:spPr>
+          <p:style>
+            <a:lnRef idx="1">
+              <a:schemeClr val="accent1"/>
+            </a:lnRef>
+            <a:fillRef idx="3">
+              <a:schemeClr val="accent1"/>
+            </a:fillRef>
+            <a:effectRef idx="2">
+              <a:schemeClr val="accent1"/>
+            </a:effectRef>
+            <a:fontRef idx="minor">
+              <a:schemeClr val="lt1"/>
+            </a:fontRef>
+          </p:style>
+          <p:txBody>
+            <a:bodyPr rtlCol="0" anchor="ctr"/>
+            <a:lstStyle/>
+            <a:p>
+              <a:pPr algn="ctr"/>
+              <a:endParaRPr lang="en-GB"/>
+            </a:p>
+          </p:txBody>
+        </p:sp>
+        <p:sp>
+          <p:nvSpPr>
+            <p:cNvPr id="7" name="Explosion 1 6"/>
+            <p:cNvSpPr/>
+            <p:nvPr/>
+          </p:nvSpPr>
+          <p:spPr>
+            <a:xfrm>
+              <a:off x="5740727" y="1650993"/>
+              <a:ext cx="135861" cy="135866"/>
+            </a:xfrm>
+            <a:prstGeom prst="irregularSeal1">
+              <a:avLst/>
+            </a:prstGeom>
+            <a:solidFill>
+              <a:schemeClr val="tx1">
+                <a:lumMod val="75000"/>
+                <a:lumOff val="25000"/>
+              </a:schemeClr>
+            </a:solidFill>
+            <a:ln>
+              <a:noFill/>
+            </a:ln>
+            <a:effectLst/>
+          </p:spPr>
+          <p:style>
+            <a:lnRef idx="1">
+              <a:schemeClr val="accent1"/>
+            </a:lnRef>
+            <a:fillRef idx="3">
+              <a:schemeClr val="accent1"/>
+            </a:fillRef>
+            <a:effectRef idx="2">
+              <a:schemeClr val="accent1"/>
+            </a:effectRef>
+            <a:fontRef idx="minor">
+              <a:schemeClr val="lt1"/>
+            </a:fontRef>
+          </p:style>
+          <p:txBody>
+            <a:bodyPr rtlCol="0" anchor="ctr"/>
+            <a:lstStyle/>
+            <a:p>
+              <a:pPr algn="ctr"/>
+              <a:endParaRPr lang="en-GB"/>
+            </a:p>
+          </p:txBody>
+        </p:sp>
+        <p:sp>
+          <p:nvSpPr>
+            <p:cNvPr id="39" name="Rectangle 38"/>
+            <p:cNvSpPr/>
+            <p:nvPr/>
+          </p:nvSpPr>
+          <p:spPr>
+            <a:xfrm>
+              <a:off x="5305850" y="1875134"/>
+              <a:ext cx="897468" cy="605600"/>
+            </a:xfrm>
+            <a:prstGeom prst="rect">
+              <a:avLst/>
+            </a:prstGeom>
+            <a:solidFill>
+              <a:schemeClr val="bg1">
+                <a:lumMod val="50000"/>
+              </a:schemeClr>
+            </a:solidFill>
+            <a:ln>
+              <a:noFill/>
+            </a:ln>
+            <a:effectLst/>
+          </p:spPr>
+          <p:style>
+            <a:lnRef idx="1">
+              <a:schemeClr val="accent1"/>
+            </a:lnRef>
+            <a:fillRef idx="3">
+              <a:schemeClr val="accent1"/>
+            </a:fillRef>
+            <a:effectRef idx="2">
+              <a:schemeClr val="accent1"/>
+            </a:effectRef>
+            <a:fontRef idx="minor">
+              <a:schemeClr val="lt1"/>
+            </a:fontRef>
+          </p:style>
+          <p:txBody>
+            <a:bodyPr rtlCol="0" anchor="ctr"/>
+            <a:lstStyle/>
+            <a:p>
+              <a:pPr algn="ctr"/>
+              <a:endParaRPr lang="en-GB"/>
+            </a:p>
+          </p:txBody>
+        </p:sp>
+        <p:sp>
+          <p:nvSpPr>
+            <p:cNvPr id="66" name="Explosion 1 65"/>
+            <p:cNvSpPr/>
+            <p:nvPr/>
+          </p:nvSpPr>
+          <p:spPr>
+            <a:xfrm>
+              <a:off x="5524433" y="1650993"/>
+              <a:ext cx="135861" cy="135866"/>
+            </a:xfrm>
+            <a:prstGeom prst="irregularSeal1">
+              <a:avLst/>
+            </a:prstGeom>
+            <a:solidFill>
+              <a:schemeClr val="tx1">
+                <a:lumMod val="75000"/>
+                <a:lumOff val="25000"/>
+              </a:schemeClr>
+            </a:solidFill>
+            <a:ln>
+              <a:noFill/>
+            </a:ln>
+            <a:effectLst/>
+          </p:spPr>
+          <p:style>
+            <a:lnRef idx="1">
+              <a:schemeClr val="accent1"/>
+            </a:lnRef>
+            <a:fillRef idx="3">
+              <a:schemeClr val="accent1"/>
+            </a:fillRef>
+            <a:effectRef idx="2">
+              <a:schemeClr val="accent1"/>
+            </a:effectRef>
+            <a:fontRef idx="minor">
+              <a:schemeClr val="lt1"/>
+            </a:fontRef>
+          </p:style>
+          <p:txBody>
+            <a:bodyPr rtlCol="0" anchor="ctr"/>
+            <a:lstStyle/>
+            <a:p>
+              <a:pPr algn="ctr"/>
+              <a:endParaRPr lang="en-GB"/>
+            </a:p>
+          </p:txBody>
+        </p:sp>
+        <p:sp>
+          <p:nvSpPr>
+            <p:cNvPr id="67" name="Explosion 1 66"/>
+            <p:cNvSpPr/>
+            <p:nvPr/>
+          </p:nvSpPr>
+          <p:spPr>
+            <a:xfrm>
+              <a:off x="5848874" y="1650993"/>
+              <a:ext cx="135861" cy="135866"/>
+            </a:xfrm>
+            <a:prstGeom prst="irregularSeal1">
+              <a:avLst/>
+            </a:prstGeom>
+            <a:solidFill>
+              <a:schemeClr val="tx1">
+                <a:lumMod val="75000"/>
+                <a:lumOff val="25000"/>
+              </a:schemeClr>
+            </a:solidFill>
+            <a:ln>
+              <a:noFill/>
+            </a:ln>
+            <a:effectLst/>
+          </p:spPr>
+          <p:style>
+            <a:lnRef idx="1">
+              <a:schemeClr val="accent1"/>
+            </a:lnRef>
+            <a:fillRef idx="3">
+              <a:schemeClr val="accent1"/>
+            </a:fillRef>
+            <a:effectRef idx="2">
+              <a:schemeClr val="accent1"/>
+            </a:effectRef>
+            <a:fontRef idx="minor">
+              <a:schemeClr val="lt1"/>
+            </a:fontRef>
+          </p:style>
+          <p:txBody>
+            <a:bodyPr rtlCol="0" anchor="ctr"/>
+            <a:lstStyle/>
+            <a:p>
+              <a:pPr algn="ctr"/>
+              <a:endParaRPr lang="en-GB"/>
+            </a:p>
+          </p:txBody>
+        </p:sp>
+        <p:grpSp>
+          <p:nvGrpSpPr>
+            <p:cNvPr id="45" name="Group 44"/>
+            <p:cNvGrpSpPr/>
+            <p:nvPr/>
+          </p:nvGrpSpPr>
+          <p:grpSpPr>
+            <a:xfrm>
+              <a:off x="4870876" y="1997796"/>
+              <a:ext cx="1767417" cy="965856"/>
+              <a:chOff x="552876" y="1845395"/>
+              <a:chExt cx="1767417" cy="965856"/>
+            </a:xfrm>
+          </p:grpSpPr>
+          <p:grpSp>
+            <p:nvGrpSpPr>
+              <p:cNvPr id="46" name="Group 45"/>
+              <p:cNvGrpSpPr/>
+              <p:nvPr/>
+            </p:nvGrpSpPr>
+            <p:grpSpPr>
+              <a:xfrm>
+                <a:off x="552876" y="1845395"/>
+                <a:ext cx="133351" cy="965856"/>
+                <a:chOff x="1746676" y="2059586"/>
+                <a:chExt cx="133351" cy="965856"/>
+              </a:xfrm>
+            </p:grpSpPr>
+            <p:sp>
+              <p:nvSpPr>
+                <p:cNvPr id="62" name="Isosceles Triangle 61"/>
+                <p:cNvSpPr/>
+                <p:nvPr/>
+              </p:nvSpPr>
+              <p:spPr>
+                <a:xfrm rot="10800000">
+                  <a:off x="1746677" y="2059586"/>
+                  <a:ext cx="133350" cy="114957"/>
+                </a:xfrm>
+                <a:prstGeom prst="triangle">
+                  <a:avLst/>
+                </a:prstGeom>
+                <a:solidFill>
+                  <a:srgbClr val="0000FF"/>
+                </a:solidFill>
+                <a:ln>
+                  <a:solidFill>
+                    <a:schemeClr val="tx1"/>
+                  </a:solidFill>
+                </a:ln>
+                <a:effectLst/>
+              </p:spPr>
+              <p:style>
+                <a:lnRef idx="1">
+                  <a:schemeClr val="accent1"/>
+                </a:lnRef>
+                <a:fillRef idx="3">
+                  <a:schemeClr val="accent1"/>
+                </a:fillRef>
+                <a:effectRef idx="2">
+                  <a:schemeClr val="accent1"/>
+                </a:effectRef>
+                <a:fontRef idx="minor">
+                  <a:schemeClr val="lt1"/>
+                </a:fontRef>
+              </p:style>
+              <p:txBody>
+                <a:bodyPr rtlCol="0" anchor="ctr"/>
+                <a:lstStyle/>
+                <a:p>
+                  <a:pPr algn="ctr"/>
+                  <a:endParaRPr lang="en-GB"/>
+                </a:p>
+              </p:txBody>
+            </p:sp>
+            <p:sp>
+              <p:nvSpPr>
+                <p:cNvPr id="63" name="Isosceles Triangle 62"/>
+                <p:cNvSpPr/>
+                <p:nvPr/>
+              </p:nvSpPr>
+              <p:spPr>
+                <a:xfrm rot="10800000">
+                  <a:off x="1746677" y="2343219"/>
+                  <a:ext cx="133350" cy="114957"/>
+                </a:xfrm>
+                <a:prstGeom prst="triangle">
+                  <a:avLst/>
+                </a:prstGeom>
+                <a:solidFill>
+                  <a:srgbClr val="0000FF"/>
+                </a:solidFill>
+                <a:ln>
+                  <a:solidFill>
+                    <a:schemeClr val="tx1"/>
+                  </a:solidFill>
+                </a:ln>
+                <a:effectLst/>
+              </p:spPr>
+              <p:style>
+                <a:lnRef idx="1">
+                  <a:schemeClr val="accent1"/>
+                </a:lnRef>
+                <a:fillRef idx="3">
+                  <a:schemeClr val="accent1"/>
+                </a:fillRef>
+                <a:effectRef idx="2">
+                  <a:schemeClr val="accent1"/>
+                </a:effectRef>
+                <a:fontRef idx="minor">
+                  <a:schemeClr val="lt1"/>
+                </a:fontRef>
+              </p:style>
+              <p:txBody>
+                <a:bodyPr rtlCol="0" anchor="ctr"/>
+                <a:lstStyle/>
+                <a:p>
+                  <a:pPr algn="ctr"/>
+                  <a:endParaRPr lang="en-GB"/>
+                </a:p>
+              </p:txBody>
+            </p:sp>
+            <p:sp>
+              <p:nvSpPr>
+                <p:cNvPr id="64" name="Isosceles Triangle 63"/>
+                <p:cNvSpPr/>
+                <p:nvPr/>
+              </p:nvSpPr>
+              <p:spPr>
+                <a:xfrm rot="10800000">
+                  <a:off x="1746677" y="2626852"/>
+                  <a:ext cx="133350" cy="114957"/>
+                </a:xfrm>
+                <a:prstGeom prst="triangle">
+                  <a:avLst/>
+                </a:prstGeom>
+                <a:solidFill>
+                  <a:srgbClr val="0000FF"/>
+                </a:solidFill>
+                <a:ln>
+                  <a:solidFill>
+                    <a:schemeClr val="tx1"/>
+                  </a:solidFill>
+                </a:ln>
+                <a:effectLst/>
+              </p:spPr>
+              <p:style>
+                <a:lnRef idx="1">
+                  <a:schemeClr val="accent1"/>
+                </a:lnRef>
+                <a:fillRef idx="3">
+                  <a:schemeClr val="accent1"/>
+                </a:fillRef>
+                <a:effectRef idx="2">
+                  <a:schemeClr val="accent1"/>
+                </a:effectRef>
+                <a:fontRef idx="minor">
+                  <a:schemeClr val="lt1"/>
+                </a:fontRef>
+              </p:style>
+              <p:txBody>
+                <a:bodyPr rtlCol="0" anchor="ctr"/>
+                <a:lstStyle/>
+                <a:p>
+                  <a:pPr algn="ctr"/>
+                  <a:endParaRPr lang="en-GB"/>
+                </a:p>
+              </p:txBody>
+            </p:sp>
+            <p:sp>
+              <p:nvSpPr>
+                <p:cNvPr id="65" name="Isosceles Triangle 64"/>
+                <p:cNvSpPr/>
+                <p:nvPr/>
+              </p:nvSpPr>
+              <p:spPr>
+                <a:xfrm rot="10800000">
+                  <a:off x="1746676" y="2910485"/>
+                  <a:ext cx="133350" cy="114957"/>
+                </a:xfrm>
+                <a:prstGeom prst="triangle">
+                  <a:avLst/>
+                </a:prstGeom>
+                <a:solidFill>
+                  <a:srgbClr val="0000FF"/>
+                </a:solidFill>
+                <a:ln>
+                  <a:solidFill>
+                    <a:schemeClr val="tx1"/>
+                  </a:solidFill>
+                </a:ln>
+                <a:effectLst/>
+              </p:spPr>
+              <p:style>
+                <a:lnRef idx="1">
+                  <a:schemeClr val="accent1"/>
+                </a:lnRef>
+                <a:fillRef idx="3">
+                  <a:schemeClr val="accent1"/>
+                </a:fillRef>
+                <a:effectRef idx="2">
+                  <a:schemeClr val="accent1"/>
+                </a:effectRef>
+                <a:fontRef idx="minor">
+                  <a:schemeClr val="lt1"/>
+                </a:fontRef>
+              </p:style>
+              <p:txBody>
+                <a:bodyPr rtlCol="0" anchor="ctr"/>
+                <a:lstStyle/>
+                <a:p>
+                  <a:pPr algn="ctr"/>
+                  <a:endParaRPr lang="en-GB"/>
+                </a:p>
+              </p:txBody>
+            </p:sp>
+          </p:grpSp>
+          <p:grpSp>
+            <p:nvGrpSpPr>
+              <p:cNvPr id="47" name="Group 46"/>
+              <p:cNvGrpSpPr/>
+              <p:nvPr/>
+            </p:nvGrpSpPr>
+            <p:grpSpPr>
+              <a:xfrm>
+                <a:off x="1097565" y="1845395"/>
+                <a:ext cx="133351" cy="965856"/>
+                <a:chOff x="1746676" y="2059586"/>
+                <a:chExt cx="133351" cy="965856"/>
+              </a:xfrm>
+            </p:grpSpPr>
+            <p:sp>
+              <p:nvSpPr>
+                <p:cNvPr id="58" name="Isosceles Triangle 57"/>
+                <p:cNvSpPr/>
+                <p:nvPr/>
+              </p:nvSpPr>
+              <p:spPr>
+                <a:xfrm rot="10800000">
+                  <a:off x="1746677" y="2059586"/>
+                  <a:ext cx="133350" cy="114957"/>
+                </a:xfrm>
+                <a:prstGeom prst="triangle">
+                  <a:avLst/>
+                </a:prstGeom>
+                <a:solidFill>
+                  <a:srgbClr val="0000FF"/>
+                </a:solidFill>
+                <a:ln>
+                  <a:solidFill>
+                    <a:schemeClr val="tx1"/>
+                  </a:solidFill>
+                </a:ln>
+                <a:effectLst/>
+              </p:spPr>
+              <p:style>
+                <a:lnRef idx="1">
+                  <a:schemeClr val="accent1"/>
+                </a:lnRef>
+                <a:fillRef idx="3">
+                  <a:schemeClr val="accent1"/>
+                </a:fillRef>
+                <a:effectRef idx="2">
+                  <a:schemeClr val="accent1"/>
+                </a:effectRef>
+                <a:fontRef idx="minor">
+                  <a:schemeClr val="lt1"/>
+                </a:fontRef>
+              </p:style>
+              <p:txBody>
+                <a:bodyPr rtlCol="0" anchor="ctr"/>
+                <a:lstStyle/>
+                <a:p>
+                  <a:pPr algn="ctr"/>
+                  <a:endParaRPr lang="en-GB"/>
+                </a:p>
+              </p:txBody>
+            </p:sp>
+            <p:sp>
+              <p:nvSpPr>
+                <p:cNvPr id="59" name="Isosceles Triangle 58"/>
+                <p:cNvSpPr/>
+                <p:nvPr/>
+              </p:nvSpPr>
+              <p:spPr>
+                <a:xfrm rot="10800000">
+                  <a:off x="1746677" y="2343219"/>
+                  <a:ext cx="133350" cy="114957"/>
+                </a:xfrm>
+                <a:prstGeom prst="triangle">
+                  <a:avLst/>
+                </a:prstGeom>
+                <a:solidFill>
+                  <a:srgbClr val="0000FF"/>
+                </a:solidFill>
+                <a:ln>
+                  <a:solidFill>
+                    <a:schemeClr val="tx1"/>
+                  </a:solidFill>
+                </a:ln>
+                <a:effectLst/>
+              </p:spPr>
+              <p:style>
+                <a:lnRef idx="1">
+                  <a:schemeClr val="accent1"/>
+                </a:lnRef>
+                <a:fillRef idx="3">
+                  <a:schemeClr val="accent1"/>
+                </a:fillRef>
+                <a:effectRef idx="2">
+                  <a:schemeClr val="accent1"/>
+                </a:effectRef>
+                <a:fontRef idx="minor">
+                  <a:schemeClr val="lt1"/>
+                </a:fontRef>
+              </p:style>
+              <p:txBody>
+                <a:bodyPr rtlCol="0" anchor="ctr"/>
+                <a:lstStyle/>
+                <a:p>
+                  <a:pPr algn="ctr"/>
+                  <a:endParaRPr lang="en-GB"/>
+                </a:p>
+              </p:txBody>
+            </p:sp>
+            <p:sp>
+              <p:nvSpPr>
+                <p:cNvPr id="60" name="Isosceles Triangle 59"/>
+                <p:cNvSpPr/>
+                <p:nvPr/>
+              </p:nvSpPr>
+              <p:spPr>
+                <a:xfrm rot="10800000">
+                  <a:off x="1746677" y="2626852"/>
+                  <a:ext cx="133350" cy="114957"/>
+                </a:xfrm>
+                <a:prstGeom prst="triangle">
+                  <a:avLst/>
+                </a:prstGeom>
+                <a:solidFill>
+                  <a:srgbClr val="0000FF"/>
+                </a:solidFill>
+                <a:ln>
+                  <a:solidFill>
+                    <a:schemeClr val="tx1"/>
+                  </a:solidFill>
+                </a:ln>
+                <a:effectLst/>
+              </p:spPr>
+              <p:style>
+                <a:lnRef idx="1">
+                  <a:schemeClr val="accent1"/>
+                </a:lnRef>
+                <a:fillRef idx="3">
+                  <a:schemeClr val="accent1"/>
+                </a:fillRef>
+                <a:effectRef idx="2">
+                  <a:schemeClr val="accent1"/>
+                </a:effectRef>
+                <a:fontRef idx="minor">
+                  <a:schemeClr val="lt1"/>
+                </a:fontRef>
+              </p:style>
+              <p:txBody>
+                <a:bodyPr rtlCol="0" anchor="ctr"/>
+                <a:lstStyle/>
+                <a:p>
+                  <a:pPr algn="ctr"/>
+                  <a:endParaRPr lang="en-GB"/>
+                </a:p>
+              </p:txBody>
+            </p:sp>
+            <p:sp>
+              <p:nvSpPr>
+                <p:cNvPr id="61" name="Isosceles Triangle 60"/>
+                <p:cNvSpPr/>
+                <p:nvPr/>
+              </p:nvSpPr>
+              <p:spPr>
+                <a:xfrm rot="10800000">
+                  <a:off x="1746676" y="2910485"/>
+                  <a:ext cx="133350" cy="114957"/>
+                </a:xfrm>
+                <a:prstGeom prst="triangle">
+                  <a:avLst/>
+                </a:prstGeom>
+                <a:solidFill>
+                  <a:srgbClr val="0000FF"/>
+                </a:solidFill>
+                <a:ln>
+                  <a:solidFill>
+                    <a:schemeClr val="tx1"/>
+                  </a:solidFill>
+                </a:ln>
+                <a:effectLst/>
+              </p:spPr>
+              <p:style>
+                <a:lnRef idx="1">
+                  <a:schemeClr val="accent1"/>
+                </a:lnRef>
+                <a:fillRef idx="3">
+                  <a:schemeClr val="accent1"/>
+                </a:fillRef>
+                <a:effectRef idx="2">
+                  <a:schemeClr val="accent1"/>
+                </a:effectRef>
+                <a:fontRef idx="minor">
+                  <a:schemeClr val="lt1"/>
+                </a:fontRef>
+              </p:style>
+              <p:txBody>
+                <a:bodyPr rtlCol="0" anchor="ctr"/>
+                <a:lstStyle/>
+                <a:p>
+                  <a:pPr algn="ctr"/>
+                  <a:endParaRPr lang="en-GB"/>
+                </a:p>
+              </p:txBody>
+            </p:sp>
+          </p:grpSp>
+          <p:grpSp>
+            <p:nvGrpSpPr>
+              <p:cNvPr id="48" name="Group 47"/>
+              <p:cNvGrpSpPr/>
+              <p:nvPr/>
+            </p:nvGrpSpPr>
+            <p:grpSpPr>
+              <a:xfrm>
+                <a:off x="1642254" y="1845395"/>
+                <a:ext cx="133351" cy="965856"/>
+                <a:chOff x="1746676" y="2059586"/>
+                <a:chExt cx="133351" cy="965856"/>
+              </a:xfrm>
+            </p:grpSpPr>
+            <p:sp>
+              <p:nvSpPr>
+                <p:cNvPr id="54" name="Isosceles Triangle 53"/>
+                <p:cNvSpPr/>
+                <p:nvPr/>
+              </p:nvSpPr>
+              <p:spPr>
+                <a:xfrm rot="10800000">
+                  <a:off x="1746677" y="2059586"/>
+                  <a:ext cx="133350" cy="114957"/>
+                </a:xfrm>
+                <a:prstGeom prst="triangle">
+                  <a:avLst/>
+                </a:prstGeom>
+                <a:solidFill>
+                  <a:srgbClr val="0000FF"/>
+                </a:solidFill>
+                <a:ln>
+                  <a:solidFill>
+                    <a:schemeClr val="tx1"/>
+                  </a:solidFill>
+                </a:ln>
+                <a:effectLst/>
+              </p:spPr>
+              <p:style>
+                <a:lnRef idx="1">
+                  <a:schemeClr val="accent1"/>
+                </a:lnRef>
+                <a:fillRef idx="3">
+                  <a:schemeClr val="accent1"/>
+                </a:fillRef>
+                <a:effectRef idx="2">
+                  <a:schemeClr val="accent1"/>
+                </a:effectRef>
+                <a:fontRef idx="minor">
+                  <a:schemeClr val="lt1"/>
+                </a:fontRef>
+              </p:style>
+              <p:txBody>
+                <a:bodyPr rtlCol="0" anchor="ctr"/>
+                <a:lstStyle/>
+                <a:p>
+                  <a:pPr algn="ctr"/>
+                  <a:endParaRPr lang="en-GB"/>
+                </a:p>
+              </p:txBody>
+            </p:sp>
+            <p:sp>
+              <p:nvSpPr>
+                <p:cNvPr id="55" name="Isosceles Triangle 54"/>
+                <p:cNvSpPr/>
+                <p:nvPr/>
+              </p:nvSpPr>
+              <p:spPr>
+                <a:xfrm rot="10800000">
+                  <a:off x="1746677" y="2343219"/>
+                  <a:ext cx="133350" cy="114957"/>
+                </a:xfrm>
+                <a:prstGeom prst="triangle">
+                  <a:avLst/>
+                </a:prstGeom>
+                <a:solidFill>
+                  <a:srgbClr val="0000FF"/>
+                </a:solidFill>
+                <a:ln>
+                  <a:solidFill>
+                    <a:schemeClr val="tx1"/>
+                  </a:solidFill>
+                </a:ln>
+                <a:effectLst/>
+              </p:spPr>
+              <p:style>
+                <a:lnRef idx="1">
+                  <a:schemeClr val="accent1"/>
+                </a:lnRef>
+                <a:fillRef idx="3">
+                  <a:schemeClr val="accent1"/>
+                </a:fillRef>
+                <a:effectRef idx="2">
+                  <a:schemeClr val="accent1"/>
+                </a:effectRef>
+                <a:fontRef idx="minor">
+                  <a:schemeClr val="lt1"/>
+                </a:fontRef>
+              </p:style>
+              <p:txBody>
+                <a:bodyPr rtlCol="0" anchor="ctr"/>
+                <a:lstStyle/>
+                <a:p>
+                  <a:pPr algn="ctr"/>
+                  <a:endParaRPr lang="en-GB"/>
+                </a:p>
+              </p:txBody>
+            </p:sp>
+            <p:sp>
+              <p:nvSpPr>
+                <p:cNvPr id="56" name="Isosceles Triangle 55"/>
+                <p:cNvSpPr/>
+                <p:nvPr/>
+              </p:nvSpPr>
+              <p:spPr>
+                <a:xfrm rot="10800000">
+                  <a:off x="1746677" y="2626852"/>
+                  <a:ext cx="133350" cy="114957"/>
+                </a:xfrm>
+                <a:prstGeom prst="triangle">
+                  <a:avLst/>
+                </a:prstGeom>
+                <a:solidFill>
+                  <a:srgbClr val="0000FF"/>
+                </a:solidFill>
+                <a:ln>
+                  <a:solidFill>
+                    <a:schemeClr val="tx1"/>
+                  </a:solidFill>
+                </a:ln>
+                <a:effectLst/>
+              </p:spPr>
+              <p:style>
+                <a:lnRef idx="1">
+                  <a:schemeClr val="accent1"/>
+                </a:lnRef>
+                <a:fillRef idx="3">
+                  <a:schemeClr val="accent1"/>
+                </a:fillRef>
+                <a:effectRef idx="2">
+                  <a:schemeClr val="accent1"/>
+                </a:effectRef>
+                <a:fontRef idx="minor">
+                  <a:schemeClr val="lt1"/>
+                </a:fontRef>
+              </p:style>
+              <p:txBody>
+                <a:bodyPr rtlCol="0" anchor="ctr"/>
+                <a:lstStyle/>
+                <a:p>
+                  <a:pPr algn="ctr"/>
+                  <a:endParaRPr lang="en-GB"/>
+                </a:p>
+              </p:txBody>
+            </p:sp>
+            <p:sp>
+              <p:nvSpPr>
+                <p:cNvPr id="57" name="Isosceles Triangle 56"/>
+                <p:cNvSpPr/>
+                <p:nvPr/>
+              </p:nvSpPr>
+              <p:spPr>
+                <a:xfrm rot="10800000">
+                  <a:off x="1746676" y="2910485"/>
+                  <a:ext cx="133350" cy="114957"/>
+                </a:xfrm>
+                <a:prstGeom prst="triangle">
+                  <a:avLst/>
+                </a:prstGeom>
+                <a:solidFill>
+                  <a:srgbClr val="0000FF"/>
+                </a:solidFill>
+                <a:ln>
+                  <a:solidFill>
+                    <a:schemeClr val="tx1"/>
+                  </a:solidFill>
+                </a:ln>
+                <a:effectLst/>
+              </p:spPr>
+              <p:style>
+                <a:lnRef idx="1">
+                  <a:schemeClr val="accent1"/>
+                </a:lnRef>
+                <a:fillRef idx="3">
+                  <a:schemeClr val="accent1"/>
+                </a:fillRef>
+                <a:effectRef idx="2">
+                  <a:schemeClr val="accent1"/>
+                </a:effectRef>
+                <a:fontRef idx="minor">
+                  <a:schemeClr val="lt1"/>
+                </a:fontRef>
+              </p:style>
+              <p:txBody>
+                <a:bodyPr rtlCol="0" anchor="ctr"/>
+                <a:lstStyle/>
+                <a:p>
+                  <a:pPr algn="ctr"/>
+                  <a:endParaRPr lang="en-GB"/>
+                </a:p>
+              </p:txBody>
+            </p:sp>
+          </p:grpSp>
+          <p:grpSp>
+            <p:nvGrpSpPr>
+              <p:cNvPr id="49" name="Group 48"/>
+              <p:cNvGrpSpPr/>
+              <p:nvPr/>
+            </p:nvGrpSpPr>
+            <p:grpSpPr>
+              <a:xfrm>
+                <a:off x="2186942" y="1845395"/>
+                <a:ext cx="133351" cy="965856"/>
+                <a:chOff x="1746676" y="2059586"/>
+                <a:chExt cx="133351" cy="965856"/>
+              </a:xfrm>
+            </p:grpSpPr>
+            <p:sp>
+              <p:nvSpPr>
+                <p:cNvPr id="50" name="Isosceles Triangle 49"/>
+                <p:cNvSpPr/>
+                <p:nvPr/>
+              </p:nvSpPr>
+              <p:spPr>
+                <a:xfrm rot="10800000">
+                  <a:off x="1746677" y="2059586"/>
+                  <a:ext cx="133350" cy="114957"/>
+                </a:xfrm>
+                <a:prstGeom prst="triangle">
+                  <a:avLst/>
+                </a:prstGeom>
+                <a:solidFill>
+                  <a:srgbClr val="0000FF"/>
+                </a:solidFill>
+                <a:ln>
+                  <a:solidFill>
+                    <a:schemeClr val="tx1"/>
+                  </a:solidFill>
+                </a:ln>
+                <a:effectLst/>
+              </p:spPr>
+              <p:style>
+                <a:lnRef idx="1">
+                  <a:schemeClr val="accent1"/>
+                </a:lnRef>
+                <a:fillRef idx="3">
+                  <a:schemeClr val="accent1"/>
+                </a:fillRef>
+                <a:effectRef idx="2">
+                  <a:schemeClr val="accent1"/>
+                </a:effectRef>
+                <a:fontRef idx="minor">
+                  <a:schemeClr val="lt1"/>
+                </a:fontRef>
+              </p:style>
+              <p:txBody>
+                <a:bodyPr rtlCol="0" anchor="ctr"/>
+                <a:lstStyle/>
+                <a:p>
+                  <a:pPr algn="ctr"/>
+                  <a:endParaRPr lang="en-GB"/>
+                </a:p>
+              </p:txBody>
+            </p:sp>
+            <p:sp>
+              <p:nvSpPr>
+                <p:cNvPr id="51" name="Isosceles Triangle 50"/>
+                <p:cNvSpPr/>
+                <p:nvPr/>
+              </p:nvSpPr>
+              <p:spPr>
+                <a:xfrm rot="10800000">
+                  <a:off x="1746677" y="2343219"/>
+                  <a:ext cx="133350" cy="114957"/>
+                </a:xfrm>
+                <a:prstGeom prst="triangle">
+                  <a:avLst/>
+                </a:prstGeom>
+                <a:solidFill>
+                  <a:srgbClr val="0000FF"/>
+                </a:solidFill>
+                <a:ln>
+                  <a:solidFill>
+                    <a:schemeClr val="tx1"/>
+                  </a:solidFill>
+                </a:ln>
+                <a:effectLst/>
+              </p:spPr>
+              <p:style>
+                <a:lnRef idx="1">
+                  <a:schemeClr val="accent1"/>
+                </a:lnRef>
+                <a:fillRef idx="3">
+                  <a:schemeClr val="accent1"/>
+                </a:fillRef>
+                <a:effectRef idx="2">
+                  <a:schemeClr val="accent1"/>
+                </a:effectRef>
+                <a:fontRef idx="minor">
+                  <a:schemeClr val="lt1"/>
+                </a:fontRef>
+              </p:style>
+              <p:txBody>
+                <a:bodyPr rtlCol="0" anchor="ctr"/>
+                <a:lstStyle/>
+                <a:p>
+                  <a:pPr algn="ctr"/>
+                  <a:endParaRPr lang="en-GB"/>
+                </a:p>
+              </p:txBody>
+            </p:sp>
+            <p:sp>
+              <p:nvSpPr>
+                <p:cNvPr id="52" name="Isosceles Triangle 51"/>
+                <p:cNvSpPr/>
+                <p:nvPr/>
+              </p:nvSpPr>
+              <p:spPr>
+                <a:xfrm rot="10800000">
+                  <a:off x="1746677" y="2626852"/>
+                  <a:ext cx="133350" cy="114957"/>
+                </a:xfrm>
+                <a:prstGeom prst="triangle">
+                  <a:avLst/>
+                </a:prstGeom>
+                <a:solidFill>
+                  <a:srgbClr val="0000FF"/>
+                </a:solidFill>
+                <a:ln>
+                  <a:solidFill>
+                    <a:schemeClr val="tx1"/>
+                  </a:solidFill>
+                </a:ln>
+                <a:effectLst/>
+              </p:spPr>
+              <p:style>
+                <a:lnRef idx="1">
+                  <a:schemeClr val="accent1"/>
+                </a:lnRef>
+                <a:fillRef idx="3">
+                  <a:schemeClr val="accent1"/>
+                </a:fillRef>
+                <a:effectRef idx="2">
+                  <a:schemeClr val="accent1"/>
+                </a:effectRef>
+                <a:fontRef idx="minor">
+                  <a:schemeClr val="lt1"/>
+                </a:fontRef>
+              </p:style>
+              <p:txBody>
+                <a:bodyPr rtlCol="0" anchor="ctr"/>
+                <a:lstStyle/>
+                <a:p>
+                  <a:pPr algn="ctr"/>
+                  <a:endParaRPr lang="en-GB"/>
+                </a:p>
+              </p:txBody>
+            </p:sp>
+            <p:sp>
+              <p:nvSpPr>
+                <p:cNvPr id="53" name="Isosceles Triangle 52"/>
+                <p:cNvSpPr/>
+                <p:nvPr/>
+              </p:nvSpPr>
+              <p:spPr>
+                <a:xfrm rot="10800000">
+                  <a:off x="1746676" y="2910485"/>
+                  <a:ext cx="133350" cy="114957"/>
+                </a:xfrm>
+                <a:prstGeom prst="triangle">
+                  <a:avLst/>
+                </a:prstGeom>
+                <a:solidFill>
+                  <a:srgbClr val="0000FF"/>
+                </a:solidFill>
+                <a:ln>
+                  <a:solidFill>
+                    <a:schemeClr val="tx1"/>
+                  </a:solidFill>
+                </a:ln>
+                <a:effectLst/>
+              </p:spPr>
+              <p:style>
+                <a:lnRef idx="1">
+                  <a:schemeClr val="accent1"/>
+                </a:lnRef>
+                <a:fillRef idx="3">
+                  <a:schemeClr val="accent1"/>
+                </a:fillRef>
+                <a:effectRef idx="2">
+                  <a:schemeClr val="accent1"/>
+                </a:effectRef>
+                <a:fontRef idx="minor">
+                  <a:schemeClr val="lt1"/>
+                </a:fontRef>
+              </p:style>
+              <p:txBody>
+                <a:bodyPr rtlCol="0" anchor="ctr"/>
+                <a:lstStyle/>
+                <a:p>
+                  <a:pPr algn="ctr"/>
+                  <a:endParaRPr lang="en-GB"/>
+                </a:p>
+              </p:txBody>
+            </p:sp>
+          </p:grpSp>
+        </p:grpSp>
+      </p:grpSp>
+      <p:grpSp>
+        <p:nvGrpSpPr>
+          <p:cNvPr id="3" name="Group 2"/>
+          <p:cNvGrpSpPr/>
+          <p:nvPr/>
+        </p:nvGrpSpPr>
+        <p:grpSpPr>
+          <a:xfrm>
+            <a:off x="2878913" y="3756010"/>
+            <a:ext cx="1772436" cy="2256600"/>
+            <a:chOff x="1123350" y="3458718"/>
+            <a:chExt cx="1772436" cy="2256600"/>
+          </a:xfrm>
+        </p:grpSpPr>
+        <p:pic>
+          <p:nvPicPr>
+            <p:cNvPr id="95" name="Picture 94" descr="Boat-Top.png"/>
+            <p:cNvPicPr>
+              <a:picLocks noChangeAspect="1"/>
+            </p:cNvPicPr>
+            <p:nvPr/>
+          </p:nvPicPr>
+          <p:blipFill>
+            <a:blip r:embed="rId2">
+              <a:extLst>
+                <a:ext uri="{28A0092B-C50C-407E-A947-70E740481C1C}">
+                  <a14:useLocalDpi xmlns:a14="http://schemas.microsoft.com/office/drawing/2010/main" val="0"/>
+                </a:ext>
+              </a:extLst>
+            </a:blip>
+            <a:stretch>
+              <a:fillRect/>
+            </a:stretch>
+          </p:blipFill>
+          <p:spPr>
+            <a:xfrm>
+              <a:off x="1693377" y="3458718"/>
+              <a:ext cx="632382" cy="1050205"/>
+            </a:xfrm>
+            <a:prstGeom prst="rect">
+              <a:avLst/>
+            </a:prstGeom>
+          </p:spPr>
+        </p:pic>
+        <p:sp>
+          <p:nvSpPr>
+            <p:cNvPr id="69" name="Rectangle 68"/>
+            <p:cNvSpPr/>
+            <p:nvPr/>
+          </p:nvSpPr>
+          <p:spPr>
+            <a:xfrm>
+              <a:off x="1560834" y="4626800"/>
+              <a:ext cx="897468" cy="605600"/>
+            </a:xfrm>
+            <a:prstGeom prst="rect">
+              <a:avLst/>
+            </a:prstGeom>
+            <a:solidFill>
+              <a:schemeClr val="bg1">
+                <a:lumMod val="50000"/>
+              </a:schemeClr>
+            </a:solidFill>
+            <a:ln>
+              <a:noFill/>
+            </a:ln>
+            <a:effectLst/>
+          </p:spPr>
+          <p:style>
+            <a:lnRef idx="1">
+              <a:schemeClr val="accent1"/>
+            </a:lnRef>
+            <a:fillRef idx="3">
+              <a:schemeClr val="accent1"/>
+            </a:fillRef>
+            <a:effectRef idx="2">
+              <a:schemeClr val="accent1"/>
+            </a:effectRef>
+            <a:fontRef idx="minor">
+              <a:schemeClr val="lt1"/>
+            </a:fontRef>
+          </p:style>
+          <p:txBody>
+            <a:bodyPr rtlCol="0" anchor="ctr"/>
+            <a:lstStyle/>
+            <a:p>
+              <a:pPr algn="ctr"/>
+              <a:endParaRPr lang="en-GB"/>
+            </a:p>
+          </p:txBody>
+        </p:sp>
+        <p:grpSp>
+          <p:nvGrpSpPr>
+            <p:cNvPr id="75" name="Group 74"/>
+            <p:cNvGrpSpPr/>
+            <p:nvPr/>
+          </p:nvGrpSpPr>
+          <p:grpSpPr>
+            <a:xfrm>
+              <a:off x="1942893" y="4749462"/>
+              <a:ext cx="133351" cy="965856"/>
+              <a:chOff x="1746676" y="2059586"/>
+              <a:chExt cx="133351" cy="965856"/>
+            </a:xfrm>
+          </p:grpSpPr>
+          <p:sp>
+            <p:nvSpPr>
+              <p:cNvPr id="81" name="Isosceles Triangle 80"/>
+              <p:cNvSpPr/>
+              <p:nvPr/>
+            </p:nvSpPr>
+            <p:spPr>
+              <a:xfrm rot="10800000">
+                <a:off x="1746677" y="2059586"/>
+                <a:ext cx="133350" cy="114957"/>
+              </a:xfrm>
+              <a:prstGeom prst="triangle">
+                <a:avLst/>
+              </a:prstGeom>
+              <a:solidFill>
+                <a:srgbClr val="0000FF"/>
+              </a:solidFill>
+              <a:ln>
+                <a:solidFill>
+                  <a:schemeClr val="tx1"/>
+                </a:solidFill>
+              </a:ln>
+              <a:effectLst/>
+            </p:spPr>
+            <p:style>
+              <a:lnRef idx="1">
+                <a:schemeClr val="accent1"/>
+              </a:lnRef>
+              <a:fillRef idx="3">
+                <a:schemeClr val="accent1"/>
+              </a:fillRef>
+              <a:effectRef idx="2">
+                <a:schemeClr val="accent1"/>
+              </a:effectRef>
+              <a:fontRef idx="minor">
+                <a:schemeClr val="lt1"/>
+              </a:fontRef>
+            </p:style>
+            <p:txBody>
+              <a:bodyPr rtlCol="0" anchor="ctr"/>
+              <a:lstStyle/>
+              <a:p>
+                <a:pPr algn="ctr"/>
+                <a:endParaRPr lang="en-GB"/>
+              </a:p>
+            </p:txBody>
+          </p:sp>
+          <p:sp>
+            <p:nvSpPr>
+              <p:cNvPr id="82" name="Isosceles Triangle 81"/>
+              <p:cNvSpPr/>
+              <p:nvPr/>
+            </p:nvSpPr>
+            <p:spPr>
+              <a:xfrm rot="10800000">
+                <a:off x="1746677" y="2343219"/>
+                <a:ext cx="133350" cy="114957"/>
+              </a:xfrm>
+              <a:prstGeom prst="triangle">
+                <a:avLst/>
+              </a:prstGeom>
+              <a:solidFill>
+                <a:srgbClr val="0000FF"/>
+              </a:solidFill>
+              <a:ln>
+                <a:solidFill>
+                  <a:schemeClr val="tx1"/>
+                </a:solidFill>
+              </a:ln>
+              <a:effectLst/>
+            </p:spPr>
+            <p:style>
+              <a:lnRef idx="1">
+                <a:schemeClr val="accent1"/>
+              </a:lnRef>
+              <a:fillRef idx="3">
+                <a:schemeClr val="accent1"/>
+              </a:fillRef>
+              <a:effectRef idx="2">
+                <a:schemeClr val="accent1"/>
+              </a:effectRef>
+              <a:fontRef idx="minor">
+                <a:schemeClr val="lt1"/>
+              </a:fontRef>
+            </p:style>
+            <p:txBody>
+              <a:bodyPr rtlCol="0" anchor="ctr"/>
+              <a:lstStyle/>
+              <a:p>
+                <a:pPr algn="ctr"/>
+                <a:endParaRPr lang="en-GB"/>
+              </a:p>
+            </p:txBody>
+          </p:sp>
+          <p:sp>
+            <p:nvSpPr>
+              <p:cNvPr id="83" name="Isosceles Triangle 82"/>
+              <p:cNvSpPr/>
+              <p:nvPr/>
+            </p:nvSpPr>
+            <p:spPr>
+              <a:xfrm rot="10800000">
+                <a:off x="1746677" y="2626852"/>
+                <a:ext cx="133350" cy="114957"/>
+              </a:xfrm>
+              <a:prstGeom prst="triangle">
+                <a:avLst/>
+              </a:prstGeom>
+              <a:solidFill>
+                <a:srgbClr val="0000FF"/>
+              </a:solidFill>
+              <a:ln>
+                <a:solidFill>
+                  <a:schemeClr val="tx1"/>
+                </a:solidFill>
+              </a:ln>
+              <a:effectLst/>
+            </p:spPr>
+            <p:style>
+              <a:lnRef idx="1">
+                <a:schemeClr val="accent1"/>
+              </a:lnRef>
+              <a:fillRef idx="3">
+                <a:schemeClr val="accent1"/>
+              </a:fillRef>
+              <a:effectRef idx="2">
+                <a:schemeClr val="accent1"/>
+              </a:effectRef>
+              <a:fontRef idx="minor">
+                <a:schemeClr val="lt1"/>
+              </a:fontRef>
+            </p:style>
+            <p:txBody>
+              <a:bodyPr rtlCol="0" anchor="ctr"/>
+              <a:lstStyle/>
+              <a:p>
+                <a:pPr algn="ctr"/>
+                <a:endParaRPr lang="en-GB"/>
+              </a:p>
+            </p:txBody>
+          </p:sp>
+          <p:sp>
+            <p:nvSpPr>
+              <p:cNvPr id="84" name="Isosceles Triangle 83"/>
+              <p:cNvSpPr/>
+              <p:nvPr/>
+            </p:nvSpPr>
+            <p:spPr>
+              <a:xfrm rot="10800000">
+                <a:off x="1746676" y="2910485"/>
+                <a:ext cx="133350" cy="114957"/>
+              </a:xfrm>
+              <a:prstGeom prst="triangle">
+                <a:avLst/>
+              </a:prstGeom>
+              <a:solidFill>
+                <a:srgbClr val="0000FF"/>
+              </a:solidFill>
+              <a:ln>
+                <a:solidFill>
+                  <a:schemeClr val="tx1"/>
+                </a:solidFill>
+              </a:ln>
+              <a:effectLst/>
+            </p:spPr>
+            <p:style>
+              <a:lnRef idx="1">
+                <a:schemeClr val="accent1"/>
+              </a:lnRef>
+              <a:fillRef idx="3">
+                <a:schemeClr val="accent1"/>
+              </a:fillRef>
+              <a:effectRef idx="2">
+                <a:schemeClr val="accent1"/>
+              </a:effectRef>
+              <a:fontRef idx="minor">
+                <a:schemeClr val="lt1"/>
+              </a:fontRef>
+            </p:style>
+            <p:txBody>
+              <a:bodyPr rtlCol="0" anchor="ctr"/>
+              <a:lstStyle/>
+              <a:p>
+                <a:pPr algn="ctr"/>
+                <a:endParaRPr lang="en-GB"/>
+              </a:p>
+            </p:txBody>
+          </p:sp>
+        </p:grpSp>
+        <p:grpSp>
+          <p:nvGrpSpPr>
+            <p:cNvPr id="2" name="Group 1"/>
+            <p:cNvGrpSpPr/>
+            <p:nvPr/>
+          </p:nvGrpSpPr>
+          <p:grpSpPr>
+            <a:xfrm>
+              <a:off x="1123350" y="4400443"/>
+              <a:ext cx="1772436" cy="135866"/>
+              <a:chOff x="1123350" y="4400443"/>
+              <a:chExt cx="1772436" cy="135866"/>
+            </a:xfrm>
+          </p:grpSpPr>
+          <p:sp>
+            <p:nvSpPr>
+              <p:cNvPr id="8" name="Explosion 1 7"/>
+              <p:cNvSpPr/>
+              <p:nvPr/>
+            </p:nvSpPr>
+            <p:spPr>
+              <a:xfrm>
+                <a:off x="1123350" y="4400443"/>
+                <a:ext cx="135861" cy="135866"/>
+              </a:xfrm>
+              <a:prstGeom prst="irregularSeal1">
+                <a:avLst/>
+              </a:prstGeom>
+              <a:solidFill>
+                <a:schemeClr val="tx1">
+                  <a:lumMod val="75000"/>
+                  <a:lumOff val="25000"/>
+                </a:schemeClr>
+              </a:solidFill>
+              <a:ln>
+                <a:noFill/>
+              </a:ln>
+              <a:effectLst/>
+            </p:spPr>
+            <p:style>
+              <a:lnRef idx="1">
+                <a:schemeClr val="accent1"/>
+              </a:lnRef>
+              <a:fillRef idx="3">
+                <a:schemeClr val="accent1"/>
+              </a:fillRef>
+              <a:effectRef idx="2">
+                <a:schemeClr val="accent1"/>
+              </a:effectRef>
+              <a:fontRef idx="minor">
+                <a:schemeClr val="lt1"/>
+              </a:fontRef>
+            </p:style>
+            <p:txBody>
+              <a:bodyPr rtlCol="0" anchor="ctr"/>
+              <a:lstStyle/>
+              <a:p>
+                <a:pPr algn="ctr"/>
+                <a:endParaRPr lang="en-GB"/>
+              </a:p>
+            </p:txBody>
+          </p:sp>
+          <p:sp>
+            <p:nvSpPr>
+              <p:cNvPr id="9" name="Explosion 1 8"/>
+              <p:cNvSpPr/>
+              <p:nvPr/>
+            </p:nvSpPr>
+            <p:spPr>
+              <a:xfrm>
+                <a:off x="2759925" y="4400443"/>
+                <a:ext cx="135861" cy="135866"/>
+              </a:xfrm>
+              <a:prstGeom prst="irregularSeal1">
+                <a:avLst/>
+              </a:prstGeom>
+              <a:solidFill>
+                <a:schemeClr val="tx1">
+                  <a:lumMod val="75000"/>
+                  <a:lumOff val="25000"/>
+                </a:schemeClr>
+              </a:solidFill>
+              <a:ln>
+                <a:noFill/>
+              </a:ln>
+              <a:effectLst/>
+            </p:spPr>
+            <p:style>
+              <a:lnRef idx="1">
+                <a:schemeClr val="accent1"/>
+              </a:lnRef>
+              <a:fillRef idx="3">
+                <a:schemeClr val="accent1"/>
+              </a:fillRef>
+              <a:effectRef idx="2">
+                <a:schemeClr val="accent1"/>
+              </a:effectRef>
+              <a:fontRef idx="minor">
+                <a:schemeClr val="lt1"/>
+              </a:fontRef>
+            </p:style>
+            <p:txBody>
+              <a:bodyPr rtlCol="0" anchor="ctr"/>
+              <a:lstStyle/>
+              <a:p>
+                <a:pPr algn="ctr"/>
+                <a:endParaRPr lang="en-GB"/>
+              </a:p>
+            </p:txBody>
+          </p:sp>
+          <p:sp>
+            <p:nvSpPr>
+              <p:cNvPr id="93" name="Explosion 1 92"/>
+              <p:cNvSpPr/>
+              <p:nvPr/>
+            </p:nvSpPr>
+            <p:spPr>
+              <a:xfrm>
+                <a:off x="1824738" y="4400443"/>
+                <a:ext cx="135861" cy="135866"/>
+              </a:xfrm>
+              <a:prstGeom prst="irregularSeal1">
+                <a:avLst/>
+              </a:prstGeom>
+              <a:solidFill>
+                <a:schemeClr val="tx1">
+                  <a:lumMod val="75000"/>
+                  <a:lumOff val="25000"/>
+                </a:schemeClr>
+              </a:solidFill>
+              <a:ln>
+                <a:noFill/>
+              </a:ln>
+              <a:effectLst/>
+            </p:spPr>
+            <p:style>
+              <a:lnRef idx="1">
+                <a:schemeClr val="accent1"/>
+              </a:lnRef>
+              <a:fillRef idx="3">
+                <a:schemeClr val="accent1"/>
+              </a:fillRef>
+              <a:effectRef idx="2">
+                <a:schemeClr val="accent1"/>
+              </a:effectRef>
+              <a:fontRef idx="minor">
+                <a:schemeClr val="lt1"/>
+              </a:fontRef>
+            </p:style>
+            <p:txBody>
+              <a:bodyPr rtlCol="0" anchor="ctr"/>
+              <a:lstStyle/>
+              <a:p>
+                <a:pPr algn="ctr"/>
+                <a:endParaRPr lang="en-GB"/>
+              </a:p>
+            </p:txBody>
+          </p:sp>
+          <p:sp>
+            <p:nvSpPr>
+              <p:cNvPr id="94" name="Explosion 1 93"/>
+              <p:cNvSpPr/>
+              <p:nvPr/>
+            </p:nvSpPr>
+            <p:spPr>
+              <a:xfrm>
+                <a:off x="2292330" y="4400443"/>
+                <a:ext cx="135861" cy="135866"/>
+              </a:xfrm>
+              <a:prstGeom prst="irregularSeal1">
+                <a:avLst/>
+              </a:prstGeom>
+              <a:solidFill>
+                <a:schemeClr val="tx1">
+                  <a:lumMod val="75000"/>
+                  <a:lumOff val="25000"/>
+                </a:schemeClr>
+              </a:solidFill>
+              <a:ln>
+                <a:noFill/>
+              </a:ln>
+              <a:effectLst/>
+            </p:spPr>
+            <p:style>
+              <a:lnRef idx="1">
+                <a:schemeClr val="accent1"/>
+              </a:lnRef>
+              <a:fillRef idx="3">
+                <a:schemeClr val="accent1"/>
+              </a:fillRef>
+              <a:effectRef idx="2">
+                <a:schemeClr val="accent1"/>
+              </a:effectRef>
+              <a:fontRef idx="minor">
+                <a:schemeClr val="lt1"/>
+              </a:fontRef>
+            </p:style>
+            <p:txBody>
+              <a:bodyPr rtlCol="0" anchor="ctr"/>
+              <a:lstStyle/>
+              <a:p>
+                <a:pPr algn="ctr"/>
+                <a:endParaRPr lang="en-GB"/>
+              </a:p>
+            </p:txBody>
+          </p:sp>
+          <p:sp>
+            <p:nvSpPr>
+              <p:cNvPr id="96" name="Explosion 1 95"/>
+              <p:cNvSpPr/>
+              <p:nvPr/>
+            </p:nvSpPr>
+            <p:spPr>
+              <a:xfrm>
+                <a:off x="1357146" y="4400443"/>
+                <a:ext cx="135861" cy="135866"/>
+              </a:xfrm>
+              <a:prstGeom prst="irregularSeal1">
+                <a:avLst/>
+              </a:prstGeom>
+              <a:solidFill>
+                <a:schemeClr val="tx1">
+                  <a:lumMod val="75000"/>
+                  <a:lumOff val="25000"/>
+                </a:schemeClr>
+              </a:solidFill>
+              <a:ln>
+                <a:noFill/>
+              </a:ln>
+              <a:effectLst/>
+            </p:spPr>
+            <p:style>
+              <a:lnRef idx="1">
+                <a:schemeClr val="accent1"/>
+              </a:lnRef>
+              <a:fillRef idx="3">
+                <a:schemeClr val="accent1"/>
+              </a:fillRef>
+              <a:effectRef idx="2">
+                <a:schemeClr val="accent1"/>
+              </a:effectRef>
+              <a:fontRef idx="minor">
+                <a:schemeClr val="lt1"/>
+              </a:fontRef>
+            </p:style>
+            <p:txBody>
+              <a:bodyPr rtlCol="0" anchor="ctr"/>
+              <a:lstStyle/>
+              <a:p>
+                <a:pPr algn="ctr"/>
+                <a:endParaRPr lang="en-GB"/>
+              </a:p>
+            </p:txBody>
+          </p:sp>
+          <p:sp>
+            <p:nvSpPr>
+              <p:cNvPr id="97" name="Explosion 1 96"/>
+              <p:cNvSpPr/>
+              <p:nvPr/>
+            </p:nvSpPr>
+            <p:spPr>
+              <a:xfrm>
+                <a:off x="1590942" y="4400443"/>
+                <a:ext cx="135861" cy="135866"/>
+              </a:xfrm>
+              <a:prstGeom prst="irregularSeal1">
+                <a:avLst/>
+              </a:prstGeom>
+              <a:solidFill>
+                <a:schemeClr val="tx1">
+                  <a:lumMod val="75000"/>
+                  <a:lumOff val="25000"/>
+                </a:schemeClr>
+              </a:solidFill>
+              <a:ln>
+                <a:noFill/>
+              </a:ln>
+              <a:effectLst/>
+            </p:spPr>
+            <p:style>
+              <a:lnRef idx="1">
+                <a:schemeClr val="accent1"/>
+              </a:lnRef>
+              <a:fillRef idx="3">
+                <a:schemeClr val="accent1"/>
+              </a:fillRef>
+              <a:effectRef idx="2">
+                <a:schemeClr val="accent1"/>
+              </a:effectRef>
+              <a:fontRef idx="minor">
+                <a:schemeClr val="lt1"/>
+              </a:fontRef>
+            </p:style>
+            <p:txBody>
+              <a:bodyPr rtlCol="0" anchor="ctr"/>
+              <a:lstStyle/>
+              <a:p>
+                <a:pPr algn="ctr"/>
+                <a:endParaRPr lang="en-GB"/>
+              </a:p>
+            </p:txBody>
+          </p:sp>
+          <p:sp>
+            <p:nvSpPr>
+              <p:cNvPr id="98" name="Explosion 1 97"/>
+              <p:cNvSpPr/>
+              <p:nvPr/>
+            </p:nvSpPr>
+            <p:spPr>
+              <a:xfrm>
+                <a:off x="2526126" y="4400443"/>
+                <a:ext cx="135861" cy="135866"/>
+              </a:xfrm>
+              <a:prstGeom prst="irregularSeal1">
+                <a:avLst/>
+              </a:prstGeom>
+              <a:solidFill>
+                <a:schemeClr val="tx1">
+                  <a:lumMod val="75000"/>
+                  <a:lumOff val="25000"/>
+                </a:schemeClr>
+              </a:solidFill>
+              <a:ln>
+                <a:noFill/>
+              </a:ln>
+              <a:effectLst/>
+            </p:spPr>
+            <p:style>
+              <a:lnRef idx="1">
+                <a:schemeClr val="accent1"/>
+              </a:lnRef>
+              <a:fillRef idx="3">
+                <a:schemeClr val="accent1"/>
+              </a:fillRef>
+              <a:effectRef idx="2">
+                <a:schemeClr val="accent1"/>
+              </a:effectRef>
+              <a:fontRef idx="minor">
+                <a:schemeClr val="lt1"/>
+              </a:fontRef>
+            </p:style>
+            <p:txBody>
+              <a:bodyPr rtlCol="0" anchor="ctr"/>
+              <a:lstStyle/>
+              <a:p>
+                <a:pPr algn="ctr"/>
+                <a:endParaRPr lang="en-GB"/>
+              </a:p>
+            </p:txBody>
+          </p:sp>
+          <p:sp>
+            <p:nvSpPr>
+              <p:cNvPr id="99" name="Explosion 1 98"/>
+              <p:cNvSpPr/>
+              <p:nvPr/>
+            </p:nvSpPr>
+            <p:spPr>
+              <a:xfrm>
+                <a:off x="2058534" y="4400443"/>
+                <a:ext cx="135861" cy="135866"/>
+              </a:xfrm>
+              <a:prstGeom prst="irregularSeal1">
+                <a:avLst/>
+              </a:prstGeom>
+              <a:solidFill>
+                <a:schemeClr val="tx1">
+                  <a:lumMod val="75000"/>
+                  <a:lumOff val="25000"/>
+                </a:schemeClr>
+              </a:solidFill>
+              <a:ln>
+                <a:noFill/>
+              </a:ln>
+              <a:effectLst/>
+            </p:spPr>
+            <p:style>
+              <a:lnRef idx="1">
+                <a:schemeClr val="accent1"/>
+              </a:lnRef>
+              <a:fillRef idx="3">
+                <a:schemeClr val="accent1"/>
+              </a:fillRef>
+              <a:effectRef idx="2">
+                <a:schemeClr val="accent1"/>
+              </a:effectRef>
+              <a:fontRef idx="minor">
+                <a:schemeClr val="lt1"/>
+              </a:fontRef>
+            </p:style>
+            <p:txBody>
+              <a:bodyPr rtlCol="0" anchor="ctr"/>
+              <a:lstStyle/>
+              <a:p>
+                <a:pPr algn="ctr"/>
+                <a:endParaRPr lang="en-GB"/>
+              </a:p>
+            </p:txBody>
+          </p:sp>
+        </p:grpSp>
+      </p:grpSp>
+    </p:spTree>
+    <p:extLst>
+      <p:ext uri="{BB962C8B-B14F-4D97-AF65-F5344CB8AC3E}">
+        <p14:creationId xmlns:p14="http://schemas.microsoft.com/office/powerpoint/2010/main" val="1200279615"/>
+      </p:ext>
+    </p:extLst>
+  </p:cSld>
+  <p:clrMapOvr>
+    <a:masterClrMapping/>
+  </p:clrMapOvr>
 </p:sld>
 </file>
 

</xml_diff>